<commit_message>
Added VI + Aula4 VTR
</commit_message>
<xml_diff>
--- a/Yr4/Sem2/CG/VCPI/Aulas/Aula1/00-Apresentacao.pptx
+++ b/Yr4/Sem2/CG/VCPI/Aulas/Aula1/00-Apresentacao.pptx
@@ -5,19 +5,16 @@
     <p:sldMasterId id="2147483649" r:id="rId1"/>
   </p:sldMasterIdLst>
   <p:notesMasterIdLst>
-    <p:notesMasterId r:id="rId9"/>
+    <p:notesMasterId r:id="rId6"/>
   </p:notesMasterIdLst>
   <p:handoutMasterIdLst>
-    <p:handoutMasterId r:id="rId10"/>
+    <p:handoutMasterId r:id="rId7"/>
   </p:handoutMasterIdLst>
   <p:sldIdLst>
     <p:sldId id="256" r:id="rId2"/>
     <p:sldId id="267" r:id="rId3"/>
-    <p:sldId id="268" r:id="rId4"/>
-    <p:sldId id="269" r:id="rId5"/>
-    <p:sldId id="258" r:id="rId6"/>
-    <p:sldId id="259" r:id="rId7"/>
-    <p:sldId id="263" r:id="rId8"/>
+    <p:sldId id="258" r:id="rId4"/>
+    <p:sldId id="259" r:id="rId5"/>
   </p:sldIdLst>
   <p:sldSz cx="9144000" cy="6858000" type="screen4x3"/>
   <p:notesSz cx="7086600" cy="10210800"/>
@@ -165,6 +162,157 @@
 </p:presentation>
 </file>
 
+<file path=ppt/changesInfos/changesInfo1.xml><?xml version="1.0" encoding="utf-8"?>
+<pc:chgInfo xmlns:a="http://schemas.openxmlformats.org/drawingml/2006/main" xmlns:r="http://schemas.openxmlformats.org/officeDocument/2006/relationships" xmlns:ac="http://schemas.microsoft.com/office/drawing/2013/main/command" xmlns:pc="http://schemas.microsoft.com/office/powerpoint/2013/main/command">
+  <pc:docChgLst>
+    <pc:chgData name="Luís Paulo Peixoto Santos" userId="1bcb44e7-5d82-436c-b2eb-8036fed75eb8" providerId="ADAL" clId="{70AF9600-BB7B-EA40-A209-74FBE4C87171}"/>
+    <pc:docChg chg="custSel delSld modSld">
+      <pc:chgData name="Luís Paulo Peixoto Santos" userId="1bcb44e7-5d82-436c-b2eb-8036fed75eb8" providerId="ADAL" clId="{70AF9600-BB7B-EA40-A209-74FBE4C87171}" dt="2024-02-04T21:51:57.873" v="589" actId="2696"/>
+      <pc:docMkLst>
+        <pc:docMk/>
+      </pc:docMkLst>
+      <pc:sldChg chg="modSp mod">
+        <pc:chgData name="Luís Paulo Peixoto Santos" userId="1bcb44e7-5d82-436c-b2eb-8036fed75eb8" providerId="ADAL" clId="{70AF9600-BB7B-EA40-A209-74FBE4C87171}" dt="2024-02-04T21:40:34.076" v="49" actId="113"/>
+        <pc:sldMkLst>
+          <pc:docMk/>
+          <pc:sldMk cId="0" sldId="256"/>
+        </pc:sldMkLst>
+        <pc:spChg chg="mod">
+          <ac:chgData name="Luís Paulo Peixoto Santos" userId="1bcb44e7-5d82-436c-b2eb-8036fed75eb8" providerId="ADAL" clId="{70AF9600-BB7B-EA40-A209-74FBE4C87171}" dt="2024-02-04T21:40:34.076" v="49" actId="113"/>
+          <ac:spMkLst>
+            <pc:docMk/>
+            <pc:sldMk cId="0" sldId="256"/>
+            <ac:spMk id="14337" creationId="{00000000-0000-0000-0000-000000000000}"/>
+          </ac:spMkLst>
+        </pc:spChg>
+      </pc:sldChg>
+      <pc:sldChg chg="addSp delSp modSp mod">
+        <pc:chgData name="Luís Paulo Peixoto Santos" userId="1bcb44e7-5d82-436c-b2eb-8036fed75eb8" providerId="ADAL" clId="{70AF9600-BB7B-EA40-A209-74FBE4C87171}" dt="2024-02-04T21:48:49.836" v="307" actId="478"/>
+        <pc:sldMkLst>
+          <pc:docMk/>
+          <pc:sldMk cId="0" sldId="258"/>
+        </pc:sldMkLst>
+        <pc:spChg chg="add del mod">
+          <ac:chgData name="Luís Paulo Peixoto Santos" userId="1bcb44e7-5d82-436c-b2eb-8036fed75eb8" providerId="ADAL" clId="{70AF9600-BB7B-EA40-A209-74FBE4C87171}" dt="2024-02-04T21:48:49.836" v="307" actId="478"/>
+          <ac:spMkLst>
+            <pc:docMk/>
+            <pc:sldMk cId="0" sldId="258"/>
+            <ac:spMk id="3" creationId="{CCBE0B3F-FF52-B9ED-309E-E70BD7B1DB7F}"/>
+          </ac:spMkLst>
+        </pc:spChg>
+        <pc:spChg chg="add mod">
+          <ac:chgData name="Luís Paulo Peixoto Santos" userId="1bcb44e7-5d82-436c-b2eb-8036fed75eb8" providerId="ADAL" clId="{70AF9600-BB7B-EA40-A209-74FBE4C87171}" dt="2024-02-04T21:48:39.421" v="306"/>
+          <ac:spMkLst>
+            <pc:docMk/>
+            <pc:sldMk cId="0" sldId="258"/>
+            <ac:spMk id="4" creationId="{8298AED9-D76A-F7C6-3640-6B5886AF6CF8}"/>
+          </ac:spMkLst>
+        </pc:spChg>
+        <pc:spChg chg="del mod">
+          <ac:chgData name="Luís Paulo Peixoto Santos" userId="1bcb44e7-5d82-436c-b2eb-8036fed75eb8" providerId="ADAL" clId="{70AF9600-BB7B-EA40-A209-74FBE4C87171}" dt="2024-02-04T21:48:36.381" v="305" actId="478"/>
+          <ac:spMkLst>
+            <pc:docMk/>
+            <pc:sldMk cId="0" sldId="258"/>
+            <ac:spMk id="17411" creationId="{00000000-0000-0000-0000-000000000000}"/>
+          </ac:spMkLst>
+        </pc:spChg>
+        <pc:picChg chg="add mod">
+          <ac:chgData name="Luís Paulo Peixoto Santos" userId="1bcb44e7-5d82-436c-b2eb-8036fed75eb8" providerId="ADAL" clId="{70AF9600-BB7B-EA40-A209-74FBE4C87171}" dt="2024-02-04T21:48:39.421" v="306"/>
+          <ac:picMkLst>
+            <pc:docMk/>
+            <pc:sldMk cId="0" sldId="258"/>
+            <ac:picMk id="5" creationId="{C3596A99-4551-0386-58D1-E8B778F03480}"/>
+          </ac:picMkLst>
+        </pc:picChg>
+      </pc:sldChg>
+      <pc:sldChg chg="modSp mod">
+        <pc:chgData name="Luís Paulo Peixoto Santos" userId="1bcb44e7-5d82-436c-b2eb-8036fed75eb8" providerId="ADAL" clId="{70AF9600-BB7B-EA40-A209-74FBE4C87171}" dt="2024-02-04T21:51:43.434" v="588" actId="20577"/>
+        <pc:sldMkLst>
+          <pc:docMk/>
+          <pc:sldMk cId="0" sldId="259"/>
+        </pc:sldMkLst>
+        <pc:spChg chg="mod">
+          <ac:chgData name="Luís Paulo Peixoto Santos" userId="1bcb44e7-5d82-436c-b2eb-8036fed75eb8" providerId="ADAL" clId="{70AF9600-BB7B-EA40-A209-74FBE4C87171}" dt="2024-02-04T21:51:43.434" v="588" actId="20577"/>
+          <ac:spMkLst>
+            <pc:docMk/>
+            <pc:sldMk cId="0" sldId="259"/>
+            <ac:spMk id="18435" creationId="{00000000-0000-0000-0000-000000000000}"/>
+          </ac:spMkLst>
+        </pc:spChg>
+      </pc:sldChg>
+      <pc:sldChg chg="del">
+        <pc:chgData name="Luís Paulo Peixoto Santos" userId="1bcb44e7-5d82-436c-b2eb-8036fed75eb8" providerId="ADAL" clId="{70AF9600-BB7B-EA40-A209-74FBE4C87171}" dt="2024-02-04T21:51:57.873" v="589" actId="2696"/>
+        <pc:sldMkLst>
+          <pc:docMk/>
+          <pc:sldMk cId="0" sldId="263"/>
+        </pc:sldMkLst>
+      </pc:sldChg>
+      <pc:sldChg chg="addSp delSp modSp mod">
+        <pc:chgData name="Luís Paulo Peixoto Santos" userId="1bcb44e7-5d82-436c-b2eb-8036fed75eb8" providerId="ADAL" clId="{70AF9600-BB7B-EA40-A209-74FBE4C87171}" dt="2024-02-04T21:47:16.347" v="291" actId="242"/>
+        <pc:sldMkLst>
+          <pc:docMk/>
+          <pc:sldMk cId="1249799742" sldId="267"/>
+        </pc:sldMkLst>
+        <pc:spChg chg="mod">
+          <ac:chgData name="Luís Paulo Peixoto Santos" userId="1bcb44e7-5d82-436c-b2eb-8036fed75eb8" providerId="ADAL" clId="{70AF9600-BB7B-EA40-A209-74FBE4C87171}" dt="2024-02-04T21:41:34.174" v="74" actId="20577"/>
+          <ac:spMkLst>
+            <pc:docMk/>
+            <pc:sldMk cId="1249799742" sldId="267"/>
+            <ac:spMk id="2" creationId="{00000000-0000-0000-0000-000000000000}"/>
+          </ac:spMkLst>
+        </pc:spChg>
+        <pc:spChg chg="del">
+          <ac:chgData name="Luís Paulo Peixoto Santos" userId="1bcb44e7-5d82-436c-b2eb-8036fed75eb8" providerId="ADAL" clId="{70AF9600-BB7B-EA40-A209-74FBE4C87171}" dt="2024-02-04T21:41:39.197" v="75" actId="478"/>
+          <ac:spMkLst>
+            <pc:docMk/>
+            <pc:sldMk cId="1249799742" sldId="267"/>
+            <ac:spMk id="3" creationId="{00000000-0000-0000-0000-000000000000}"/>
+          </ac:spMkLst>
+        </pc:spChg>
+        <pc:spChg chg="del">
+          <ac:chgData name="Luís Paulo Peixoto Santos" userId="1bcb44e7-5d82-436c-b2eb-8036fed75eb8" providerId="ADAL" clId="{70AF9600-BB7B-EA40-A209-74FBE4C87171}" dt="2024-02-04T21:41:48.814" v="77" actId="478"/>
+          <ac:spMkLst>
+            <pc:docMk/>
+            <pc:sldMk cId="1249799742" sldId="267"/>
+            <ac:spMk id="6" creationId="{00000000-0000-0000-0000-000000000000}"/>
+          </ac:spMkLst>
+        </pc:spChg>
+        <pc:spChg chg="add del mod">
+          <ac:chgData name="Luís Paulo Peixoto Santos" userId="1bcb44e7-5d82-436c-b2eb-8036fed75eb8" providerId="ADAL" clId="{70AF9600-BB7B-EA40-A209-74FBE4C87171}" dt="2024-02-04T21:41:44.213" v="76" actId="478"/>
+          <ac:spMkLst>
+            <pc:docMk/>
+            <pc:sldMk cId="1249799742" sldId="267"/>
+            <ac:spMk id="8" creationId="{D9A2E8F6-9AC7-BAF3-4A80-BD60FCC61223}"/>
+          </ac:spMkLst>
+        </pc:spChg>
+        <pc:graphicFrameChg chg="add mod modGraphic">
+          <ac:chgData name="Luís Paulo Peixoto Santos" userId="1bcb44e7-5d82-436c-b2eb-8036fed75eb8" providerId="ADAL" clId="{70AF9600-BB7B-EA40-A209-74FBE4C87171}" dt="2024-02-04T21:47:16.347" v="291" actId="242"/>
+          <ac:graphicFrameMkLst>
+            <pc:docMk/>
+            <pc:sldMk cId="1249799742" sldId="267"/>
+            <ac:graphicFrameMk id="9" creationId="{FD5739F8-982A-0E8E-DDED-72B9A72E6F49}"/>
+          </ac:graphicFrameMkLst>
+        </pc:graphicFrameChg>
+      </pc:sldChg>
+      <pc:sldChg chg="del">
+        <pc:chgData name="Luís Paulo Peixoto Santos" userId="1bcb44e7-5d82-436c-b2eb-8036fed75eb8" providerId="ADAL" clId="{70AF9600-BB7B-EA40-A209-74FBE4C87171}" dt="2024-02-04T21:47:28.700" v="292" actId="2696"/>
+        <pc:sldMkLst>
+          <pc:docMk/>
+          <pc:sldMk cId="2102697176" sldId="268"/>
+        </pc:sldMkLst>
+      </pc:sldChg>
+      <pc:sldChg chg="del">
+        <pc:chgData name="Luís Paulo Peixoto Santos" userId="1bcb44e7-5d82-436c-b2eb-8036fed75eb8" providerId="ADAL" clId="{70AF9600-BB7B-EA40-A209-74FBE4C87171}" dt="2024-02-04T21:47:28.700" v="292" actId="2696"/>
+        <pc:sldMkLst>
+          <pc:docMk/>
+          <pc:sldMk cId="3629698168" sldId="269"/>
+        </pc:sldMkLst>
+      </pc:sldChg>
+    </pc:docChg>
+  </pc:docChgLst>
+</pc:chgInfo>
+</file>
+
 <file path=ppt/handoutMasters/handoutMaster1.xml><?xml version="1.0" encoding="utf-8"?>
 <p:handoutMaster xmlns:a="http://schemas.openxmlformats.org/drawingml/2006/main" xmlns:r="http://schemas.openxmlformats.org/officeDocument/2006/relationships" xmlns:p="http://schemas.openxmlformats.org/presentationml/2006/main">
   <p:cSld>
@@ -247,7 +395,7 @@
           <a:p>
             <a:fld id="{D8D2DA04-8CAD-D642-9ECB-A5941C16D03A}" type="datetimeFigureOut">
               <a:rPr lang="pt-PT" smtClean="0"/>
-              <a:t>14/02/23</a:t>
+              <a:t>04/02/24</a:t>
             </a:fld>
             <a:endParaRPr lang="pt-PT"/>
           </a:p>
@@ -1082,7 +1230,7 @@
             </a:pPr>
             <a:r>
               <a:rPr lang="en-US"/>
-              <a:t>Visualização e Iluminação</a:t>
+              <a:t>VC e Processamento de Imagem</a:t>
             </a:r>
             <a:endParaRPr lang="pt-PT" dirty="0"/>
           </a:p>
@@ -1257,7 +1405,7 @@
             </a:pPr>
             <a:r>
               <a:rPr lang="en-US"/>
-              <a:t>Visualização e Iluminação</a:t>
+              <a:t>VC e Processamento de Imagem</a:t>
             </a:r>
             <a:endParaRPr lang="pt-PT" dirty="0"/>
           </a:p>
@@ -1425,7 +1573,7 @@
             </a:pPr>
             <a:r>
               <a:rPr lang="en-US"/>
-              <a:t>Visualização e Iluminação</a:t>
+              <a:t>VC e Processamento de Imagem</a:t>
             </a:r>
             <a:endParaRPr lang="pt-PT"/>
           </a:p>
@@ -1611,7 +1759,7 @@
             </a:pPr>
             <a:r>
               <a:rPr lang="en-US"/>
-              <a:t>Visualização e Iluminação</a:t>
+              <a:t>VC e Processamento de Imagem</a:t>
             </a:r>
             <a:endParaRPr lang="pt-PT" dirty="0"/>
           </a:p>
@@ -1893,7 +2041,7 @@
             </a:pPr>
             <a:r>
               <a:rPr lang="en-US"/>
-              <a:t>Visualização e Iluminação</a:t>
+              <a:t>VC e Processamento de Imagem</a:t>
             </a:r>
             <a:endParaRPr lang="pt-PT" dirty="0"/>
           </a:p>
@@ -2314,7 +2462,7 @@
             </a:pPr>
             <a:r>
               <a:rPr lang="en-US"/>
-              <a:t>Visualização e Iluminação</a:t>
+              <a:t>VC e Processamento de Imagem</a:t>
             </a:r>
             <a:endParaRPr lang="pt-PT" dirty="0"/>
           </a:p>
@@ -2428,7 +2576,7 @@
             </a:pPr>
             <a:r>
               <a:rPr lang="en-US"/>
-              <a:t>Visualização e Iluminação</a:t>
+              <a:t>VC e Processamento de Imagem</a:t>
             </a:r>
             <a:endParaRPr lang="pt-PT" dirty="0"/>
           </a:p>
@@ -2520,7 +2668,7 @@
             </a:pPr>
             <a:r>
               <a:rPr lang="en-US"/>
-              <a:t>Visualização e Iluminação</a:t>
+              <a:t>VC e Processamento de Imagem</a:t>
             </a:r>
             <a:endParaRPr lang="pt-PT" dirty="0"/>
           </a:p>
@@ -2792,7 +2940,7 @@
             </a:pPr>
             <a:r>
               <a:rPr lang="en-US"/>
-              <a:t>Visualização e Iluminação</a:t>
+              <a:t>VC e Processamento de Imagem</a:t>
             </a:r>
             <a:endParaRPr lang="pt-PT" dirty="0"/>
           </a:p>
@@ -3042,7 +3190,7 @@
             </a:pPr>
             <a:r>
               <a:rPr lang="en-US"/>
-              <a:t>Visualização e Iluminação</a:t>
+              <a:t>VC e Processamento de Imagem</a:t>
             </a:r>
             <a:endParaRPr lang="pt-PT" dirty="0"/>
           </a:p>
@@ -3281,7 +3429,7 @@
             </a:pPr>
             <a:r>
               <a:rPr lang="en-US"/>
-              <a:t>Visualização e Iluminação</a:t>
+              <a:t>VC e Processamento de Imagem</a:t>
             </a:r>
             <a:endParaRPr lang="pt-PT" dirty="0"/>
           </a:p>
@@ -3874,17 +4022,47 @@
             <a:pPr eaLnBrk="1" hangingPunct="1"/>
             <a:r>
               <a:rPr lang="en-GB" dirty="0" err="1"/>
-              <a:t>Visualização</a:t>
+              <a:t>Visão</a:t>
             </a:r>
             <a:r>
               <a:rPr lang="en-GB" dirty="0"/>
-              <a:t> e </a:t>
+              <a:t> </a:t>
             </a:r>
             <a:r>
               <a:rPr lang="en-GB" dirty="0" err="1"/>
-              <a:t>Iluminação</a:t>
-            </a:r>
-            <a:endParaRPr lang="en-GB" dirty="0"/>
+              <a:t>por</a:t>
+            </a:r>
+            <a:r>
+              <a:rPr lang="en-GB" dirty="0"/>
+              <a:t> </a:t>
+            </a:r>
+            <a:r>
+              <a:rPr lang="en-GB" dirty="0" err="1"/>
+              <a:t>Computador</a:t>
+            </a:r>
+            <a:br>
+              <a:rPr lang="en-GB" dirty="0"/>
+            </a:br>
+            <a:r>
+              <a:rPr lang="en-GB" dirty="0"/>
+              <a:t>e</a:t>
+            </a:r>
+            <a:br>
+              <a:rPr lang="en-GB" dirty="0"/>
+            </a:br>
+            <a:r>
+              <a:rPr lang="en-GB" b="1" dirty="0" err="1"/>
+              <a:t>Processamento</a:t>
+            </a:r>
+            <a:r>
+              <a:rPr lang="en-GB" b="1" dirty="0"/>
+              <a:t> de </a:t>
+            </a:r>
+            <a:r>
+              <a:rPr lang="en-GB" b="1" dirty="0" err="1"/>
+              <a:t>Imagem</a:t>
+            </a:r>
+            <a:endParaRPr lang="en-GB" b="1" dirty="0"/>
           </a:p>
         </p:txBody>
       </p:sp>
@@ -3910,30 +4088,31 @@
           <a:p>
             <a:pPr eaLnBrk="1" hangingPunct="1"/>
             <a:r>
-              <a:rPr lang="en-GB" sz="3200"/>
+              <a:rPr lang="en-GB" sz="3200" dirty="0" err="1"/>
               <a:t>Apresentação</a:t>
             </a:r>
+            <a:endParaRPr lang="en-GB" sz="3200" dirty="0"/>
           </a:p>
           <a:p>
             <a:pPr eaLnBrk="1" hangingPunct="1"/>
-            <a:endParaRPr lang="en-GB" sz="3200"/>
+            <a:endParaRPr lang="en-GB" sz="3200" dirty="0"/>
           </a:p>
           <a:p>
             <a:pPr eaLnBrk="1" hangingPunct="1"/>
-            <a:endParaRPr lang="en-GB" sz="3200"/>
+            <a:endParaRPr lang="en-GB" sz="3200" dirty="0"/>
           </a:p>
           <a:p>
             <a:pPr eaLnBrk="1" hangingPunct="1"/>
-            <a:endParaRPr lang="en-GB" sz="3200"/>
+            <a:endParaRPr lang="en-GB" sz="3200" dirty="0"/>
           </a:p>
           <a:p>
             <a:pPr eaLnBrk="1" hangingPunct="1"/>
-            <a:endParaRPr lang="en-GB" sz="1800"/>
+            <a:endParaRPr lang="en-GB" sz="1800" dirty="0"/>
           </a:p>
           <a:p>
             <a:pPr eaLnBrk="1" hangingPunct="1"/>
             <a:r>
-              <a:rPr lang="en-GB" sz="1800"/>
+              <a:rPr lang="en-GB" sz="1800" dirty="0"/>
               <a:t>Luís Paulo Peixoto dos Santos</a:t>
             </a:r>
           </a:p>
@@ -3981,32 +4160,7 @@
           <a:p>
             <a:r>
               <a:rPr lang="pt-PT" dirty="0"/>
-              <a:t>Objecto</a:t>
-            </a:r>
-          </a:p>
-        </p:txBody>
-      </p:sp>
-      <p:sp>
-        <p:nvSpPr>
-          <p:cNvPr id="3" name="Marcador de Posição de Conteúdo 2"/>
-          <p:cNvSpPr>
-            <a:spLocks noGrp="1"/>
-          </p:cNvSpPr>
-          <p:nvPr>
-            <p:ph idx="1"/>
-          </p:nvPr>
-        </p:nvSpPr>
-        <p:spPr/>
-        <p:txBody>
-          <a:bodyPr/>
-          <a:lstStyle/>
-          <a:p>
-            <a:pPr marL="0" indent="0" algn="ctr">
-              <a:buNone/>
-            </a:pPr>
-            <a:r>
-              <a:rPr lang="pt-PT" sz="2800" b="1" dirty="0"/>
-              <a:t>Iluminação Global Fisicamente Correcta</a:t>
+              <a:t>Calendarização</a:t>
             </a:r>
           </a:p>
         </p:txBody>
@@ -4031,7 +4185,7 @@
             </a:pPr>
             <a:r>
               <a:rPr lang="en-US"/>
-              <a:t>Visualização e Iluminação</a:t>
+              <a:t>VC e Processamento de Imagem</a:t>
             </a:r>
             <a:endParaRPr lang="pt-PT"/>
           </a:p>
@@ -4066,286 +4220,452 @@
           </a:p>
         </p:txBody>
       </p:sp>
-      <p:sp>
-        <p:nvSpPr>
-          <p:cNvPr id="6" name="Rectângulo 5"/>
-          <p:cNvSpPr/>
-          <p:nvPr/>
-        </p:nvSpPr>
-        <p:spPr>
-          <a:xfrm>
-            <a:off x="625091" y="2852936"/>
-            <a:ext cx="7920880" cy="1477328"/>
-          </a:xfrm>
-          <a:prstGeom prst="rect">
-            <a:avLst/>
-          </a:prstGeom>
-        </p:spPr>
-        <p:txBody>
-          <a:bodyPr wrap="square">
-            <a:spAutoFit/>
-          </a:bodyPr>
-          <a:lstStyle/>
-          <a:p>
-            <a:pPr algn="just">
-              <a:lnSpc>
-                <a:spcPct val="90000"/>
-              </a:lnSpc>
-              <a:buFontTx/>
-              <a:buNone/>
-            </a:pPr>
-            <a:r>
-              <a:rPr lang="en-GB" sz="2000" b="1" dirty="0">
-                <a:latin typeface="Calibri" panose="020F0502020204030204" pitchFamily="34" charset="0"/>
-              </a:rPr>
-              <a:t>“… </a:t>
-            </a:r>
-            <a:r>
-              <a:rPr lang="en-GB" sz="2000" b="1" dirty="0" err="1">
-                <a:latin typeface="Calibri" panose="020F0502020204030204" pitchFamily="34" charset="0"/>
-              </a:rPr>
-              <a:t>desenvolver</a:t>
-            </a:r>
-            <a:r>
-              <a:rPr lang="en-GB" sz="2000" b="1" dirty="0">
-                <a:latin typeface="Calibri" panose="020F0502020204030204" pitchFamily="34" charset="0"/>
-              </a:rPr>
-              <a:t> </a:t>
-            </a:r>
-            <a:r>
-              <a:rPr lang="en-GB" sz="2000" b="1" dirty="0" err="1">
-                <a:latin typeface="Calibri" panose="020F0502020204030204" pitchFamily="34" charset="0"/>
-              </a:rPr>
-              <a:t>modelos</a:t>
-            </a:r>
-            <a:r>
-              <a:rPr lang="en-GB" sz="2000" b="1" dirty="0">
-                <a:latin typeface="Calibri" panose="020F0502020204030204" pitchFamily="34" charset="0"/>
-              </a:rPr>
-              <a:t> de </a:t>
-            </a:r>
-            <a:r>
-              <a:rPr lang="en-GB" sz="2000" b="1" dirty="0" err="1">
-                <a:latin typeface="Calibri" panose="020F0502020204030204" pitchFamily="34" charset="0"/>
-              </a:rPr>
-              <a:t>iluminação</a:t>
-            </a:r>
-            <a:r>
-              <a:rPr lang="en-GB" sz="2000" b="1" dirty="0">
-                <a:latin typeface="Calibri" panose="020F0502020204030204" pitchFamily="34" charset="0"/>
-              </a:rPr>
-              <a:t> e </a:t>
-            </a:r>
-            <a:r>
-              <a:rPr lang="en-GB" sz="2000" b="1" dirty="0" err="1">
-                <a:latin typeface="Calibri" panose="020F0502020204030204" pitchFamily="34" charset="0"/>
-              </a:rPr>
-              <a:t>transporte</a:t>
-            </a:r>
-            <a:r>
-              <a:rPr lang="en-GB" sz="2000" b="1" dirty="0">
-                <a:latin typeface="Calibri" panose="020F0502020204030204" pitchFamily="34" charset="0"/>
-              </a:rPr>
-              <a:t> de luz </a:t>
-            </a:r>
-            <a:r>
-              <a:rPr lang="en-GB" sz="2000" b="1" dirty="0" err="1">
-                <a:latin typeface="Calibri" panose="020F0502020204030204" pitchFamily="34" charset="0"/>
-              </a:rPr>
-              <a:t>baseados</a:t>
-            </a:r>
-            <a:r>
-              <a:rPr lang="en-GB" sz="2000" b="1" dirty="0">
-                <a:latin typeface="Calibri" panose="020F0502020204030204" pitchFamily="34" charset="0"/>
-              </a:rPr>
-              <a:t> </a:t>
-            </a:r>
-            <a:r>
-              <a:rPr lang="en-GB" sz="2000" b="1" dirty="0" err="1">
-                <a:latin typeface="Calibri" panose="020F0502020204030204" pitchFamily="34" charset="0"/>
-              </a:rPr>
-              <a:t>nas</a:t>
-            </a:r>
-            <a:r>
-              <a:rPr lang="en-GB" sz="2000" b="1" dirty="0">
-                <a:latin typeface="Calibri" panose="020F0502020204030204" pitchFamily="34" charset="0"/>
-              </a:rPr>
-              <a:t> leis da </a:t>
-            </a:r>
-            <a:r>
-              <a:rPr lang="en-GB" sz="2000" b="1" dirty="0" err="1">
-                <a:latin typeface="Calibri" panose="020F0502020204030204" pitchFamily="34" charset="0"/>
-              </a:rPr>
-              <a:t>física</a:t>
-            </a:r>
-            <a:r>
-              <a:rPr lang="en-GB" sz="2000" b="1" dirty="0">
-                <a:latin typeface="Calibri" panose="020F0502020204030204" pitchFamily="34" charset="0"/>
-              </a:rPr>
-              <a:t> e </a:t>
-            </a:r>
-            <a:r>
-              <a:rPr lang="en-GB" sz="2000" b="1" dirty="0" err="1">
-                <a:latin typeface="Calibri" panose="020F0502020204030204" pitchFamily="34" charset="0"/>
-              </a:rPr>
-              <a:t>processos</a:t>
-            </a:r>
-            <a:r>
-              <a:rPr lang="en-GB" sz="2000" b="1" dirty="0">
-                <a:latin typeface="Calibri" panose="020F0502020204030204" pitchFamily="34" charset="0"/>
-              </a:rPr>
-              <a:t> de </a:t>
-            </a:r>
-            <a:r>
-              <a:rPr lang="en-GB" sz="2000" b="1" dirty="0" err="1">
-                <a:latin typeface="Calibri" panose="020F0502020204030204" pitchFamily="34" charset="0"/>
-              </a:rPr>
-              <a:t>visualização</a:t>
-            </a:r>
-            <a:r>
-              <a:rPr lang="en-GB" sz="2000" b="1" dirty="0">
-                <a:latin typeface="Calibri" panose="020F0502020204030204" pitchFamily="34" charset="0"/>
-              </a:rPr>
-              <a:t> </a:t>
-            </a:r>
-            <a:r>
-              <a:rPr lang="en-GB" sz="2000" b="1" dirty="0" err="1">
-                <a:latin typeface="Calibri" panose="020F0502020204030204" pitchFamily="34" charset="0"/>
-              </a:rPr>
-              <a:t>perceptuais</a:t>
-            </a:r>
-            <a:r>
-              <a:rPr lang="en-GB" sz="2000" b="1" dirty="0">
-                <a:latin typeface="Calibri" panose="020F0502020204030204" pitchFamily="34" charset="0"/>
-              </a:rPr>
-              <a:t> </a:t>
-            </a:r>
-            <a:r>
-              <a:rPr lang="en-GB" sz="2000" b="1" dirty="0" err="1">
-                <a:latin typeface="Calibri" panose="020F0502020204030204" pitchFamily="34" charset="0"/>
-              </a:rPr>
-              <a:t>que</a:t>
-            </a:r>
-            <a:r>
-              <a:rPr lang="en-GB" sz="2000" b="1" dirty="0">
-                <a:latin typeface="Calibri" panose="020F0502020204030204" pitchFamily="34" charset="0"/>
-              </a:rPr>
-              <a:t> </a:t>
-            </a:r>
-            <a:r>
-              <a:rPr lang="en-GB" sz="2000" b="1" dirty="0" err="1">
-                <a:latin typeface="Calibri" panose="020F0502020204030204" pitchFamily="34" charset="0"/>
-              </a:rPr>
-              <a:t>produzam</a:t>
-            </a:r>
-            <a:r>
-              <a:rPr lang="en-GB" sz="2000" b="1" dirty="0">
-                <a:latin typeface="Calibri" panose="020F0502020204030204" pitchFamily="34" charset="0"/>
-              </a:rPr>
-              <a:t> </a:t>
-            </a:r>
-            <a:r>
-              <a:rPr lang="en-GB" sz="2000" b="1" dirty="0" err="1">
-                <a:latin typeface="Calibri" panose="020F0502020204030204" pitchFamily="34" charset="0"/>
-              </a:rPr>
-              <a:t>imagens</a:t>
-            </a:r>
-            <a:r>
-              <a:rPr lang="en-GB" sz="2000" b="1" dirty="0">
-                <a:latin typeface="Calibri" panose="020F0502020204030204" pitchFamily="34" charset="0"/>
-              </a:rPr>
-              <a:t> </a:t>
-            </a:r>
-            <a:r>
-              <a:rPr lang="en-GB" sz="2000" b="1" dirty="0" err="1">
-                <a:latin typeface="Calibri" panose="020F0502020204030204" pitchFamily="34" charset="0"/>
-              </a:rPr>
-              <a:t>sintéticas</a:t>
-            </a:r>
-            <a:r>
-              <a:rPr lang="en-GB" sz="2000" b="1" dirty="0">
-                <a:latin typeface="Calibri" panose="020F0502020204030204" pitchFamily="34" charset="0"/>
-              </a:rPr>
-              <a:t> visual e/</a:t>
-            </a:r>
-            <a:r>
-              <a:rPr lang="en-GB" sz="2000" b="1" dirty="0" err="1">
-                <a:latin typeface="Calibri" panose="020F0502020204030204" pitchFamily="34" charset="0"/>
-              </a:rPr>
-              <a:t>ou</a:t>
-            </a:r>
-            <a:r>
-              <a:rPr lang="en-GB" sz="2000" b="1" dirty="0">
-                <a:latin typeface="Calibri" panose="020F0502020204030204" pitchFamily="34" charset="0"/>
-              </a:rPr>
-              <a:t> </a:t>
-            </a:r>
-            <a:r>
-              <a:rPr lang="en-GB" sz="2000" b="1" dirty="0" err="1">
-                <a:latin typeface="Calibri" panose="020F0502020204030204" pitchFamily="34" charset="0"/>
-              </a:rPr>
-              <a:t>mensuravelmente</a:t>
-            </a:r>
-            <a:r>
-              <a:rPr lang="en-GB" sz="2000" b="1" dirty="0">
-                <a:latin typeface="Calibri" panose="020F0502020204030204" pitchFamily="34" charset="0"/>
-              </a:rPr>
-              <a:t> </a:t>
-            </a:r>
-            <a:r>
-              <a:rPr lang="en-GB" sz="2000" b="1" dirty="0" err="1">
-                <a:latin typeface="Calibri" panose="020F0502020204030204" pitchFamily="34" charset="0"/>
-              </a:rPr>
-              <a:t>indistinguíveis</a:t>
-            </a:r>
-            <a:r>
-              <a:rPr lang="en-GB" sz="2000" b="1" dirty="0">
-                <a:latin typeface="Calibri" panose="020F0502020204030204" pitchFamily="34" charset="0"/>
-              </a:rPr>
-              <a:t> de </a:t>
-            </a:r>
-            <a:r>
-              <a:rPr lang="en-GB" sz="2000" b="1" dirty="0" err="1">
-                <a:latin typeface="Calibri" panose="020F0502020204030204" pitchFamily="34" charset="0"/>
-              </a:rPr>
-              <a:t>imagens</a:t>
-            </a:r>
-            <a:r>
-              <a:rPr lang="en-GB" sz="2000" b="1" dirty="0">
-                <a:latin typeface="Calibri" panose="020F0502020204030204" pitchFamily="34" charset="0"/>
-              </a:rPr>
-              <a:t> do </a:t>
-            </a:r>
-            <a:r>
-              <a:rPr lang="en-GB" sz="2000" b="1" dirty="0" err="1">
-                <a:latin typeface="Calibri" panose="020F0502020204030204" pitchFamily="34" charset="0"/>
-              </a:rPr>
-              <a:t>mundo</a:t>
-            </a:r>
-            <a:r>
-              <a:rPr lang="en-GB" sz="2000" b="1" dirty="0">
-                <a:latin typeface="Calibri" panose="020F0502020204030204" pitchFamily="34" charset="0"/>
-              </a:rPr>
-              <a:t> real…”. </a:t>
-            </a:r>
-          </a:p>
-          <a:p>
-            <a:pPr algn="just">
-              <a:lnSpc>
-                <a:spcPct val="90000"/>
-              </a:lnSpc>
-              <a:buFontTx/>
-              <a:buNone/>
-            </a:pPr>
-            <a:r>
-              <a:rPr lang="en-GB" sz="2000" b="1" dirty="0">
-                <a:latin typeface="Calibri" panose="020F0502020204030204" pitchFamily="34" charset="0"/>
-              </a:rPr>
-              <a:t>				[Greenberg97]</a:t>
-            </a:r>
-          </a:p>
-        </p:txBody>
-      </p:sp>
+      <p:graphicFrame>
+        <p:nvGraphicFramePr>
+          <p:cNvPr id="9" name="Tabela 8">
+            <a:extLst>
+              <a:ext uri="{FF2B5EF4-FFF2-40B4-BE49-F238E27FC236}">
+                <a16:creationId xmlns:a16="http://schemas.microsoft.com/office/drawing/2014/main" id="{FD5739F8-982A-0E8E-DDED-72B9A72E6F49}"/>
+              </a:ext>
+            </a:extLst>
+          </p:cNvPr>
+          <p:cNvGraphicFramePr>
+            <a:graphicFrameLocks noGrp="1"/>
+          </p:cNvGraphicFramePr>
+          <p:nvPr>
+            <p:extLst>
+              <p:ext uri="{D42A27DB-BD31-4B8C-83A1-F6EECF244321}">
+                <p14:modId xmlns:p14="http://schemas.microsoft.com/office/powerpoint/2010/main" val="4282407340"/>
+              </p:ext>
+            </p:extLst>
+          </p:nvPr>
+        </p:nvGraphicFramePr>
+        <p:xfrm>
+          <a:off x="1043608" y="2381727"/>
+          <a:ext cx="7224464" cy="2768600"/>
+        </p:xfrm>
+        <a:graphic>
+          <a:graphicData uri="http://schemas.openxmlformats.org/drawingml/2006/table">
+            <a:tbl>
+              <a:tblPr firstRow="1" bandRow="1">
+                <a:tableStyleId>{00A15C55-8517-42AA-B614-E9B94910E393}</a:tableStyleId>
+              </a:tblPr>
+              <a:tblGrid>
+                <a:gridCol w="1649463">
+                  <a:extLst>
+                    <a:ext uri="{9D8B030D-6E8A-4147-A177-3AD203B41FA5}">
+                      <a16:colId xmlns:a16="http://schemas.microsoft.com/office/drawing/2014/main" val="1023256990"/>
+                    </a:ext>
+                  </a:extLst>
+                </a:gridCol>
+                <a:gridCol w="1237398">
+                  <a:extLst>
+                    <a:ext uri="{9D8B030D-6E8A-4147-A177-3AD203B41FA5}">
+                      <a16:colId xmlns:a16="http://schemas.microsoft.com/office/drawing/2014/main" val="2681812743"/>
+                    </a:ext>
+                  </a:extLst>
+                </a:gridCol>
+                <a:gridCol w="4337603">
+                  <a:extLst>
+                    <a:ext uri="{9D8B030D-6E8A-4147-A177-3AD203B41FA5}">
+                      <a16:colId xmlns:a16="http://schemas.microsoft.com/office/drawing/2014/main" val="1892031440"/>
+                    </a:ext>
+                  </a:extLst>
+                </a:gridCol>
+              </a:tblGrid>
+              <a:tr h="370840">
+                <a:tc>
+                  <a:txBody>
+                    <a:bodyPr/>
+                    <a:lstStyle/>
+                    <a:p>
+                      <a:pPr algn="ctr"/>
+                      <a:r>
+                        <a:rPr lang="en-GB" dirty="0" err="1"/>
+                        <a:t>Semana</a:t>
+                      </a:r>
+                      <a:endParaRPr lang="en-GB" dirty="0"/>
+                    </a:p>
+                  </a:txBody>
+                  <a:tcPr/>
+                </a:tc>
+                <a:tc>
+                  <a:txBody>
+                    <a:bodyPr/>
+                    <a:lstStyle/>
+                    <a:p>
+                      <a:pPr algn="ctr"/>
+                      <a:r>
+                        <a:rPr lang="en-GB" dirty="0"/>
+                        <a:t>Data</a:t>
+                      </a:r>
+                    </a:p>
+                  </a:txBody>
+                  <a:tcPr/>
+                </a:tc>
+                <a:tc>
+                  <a:txBody>
+                    <a:bodyPr/>
+                    <a:lstStyle/>
+                    <a:p>
+                      <a:pPr algn="ctr"/>
+                      <a:r>
+                        <a:rPr lang="en-GB" dirty="0" err="1"/>
+                        <a:t>Programa</a:t>
+                      </a:r>
+                      <a:endParaRPr lang="en-GB" dirty="0"/>
+                    </a:p>
+                  </a:txBody>
+                  <a:tcPr/>
+                </a:tc>
+                <a:extLst>
+                  <a:ext uri="{0D108BD9-81ED-4DB2-BD59-A6C34878D82A}">
+                    <a16:rowId xmlns:a16="http://schemas.microsoft.com/office/drawing/2014/main" val="2735179170"/>
+                  </a:ext>
+                </a:extLst>
+              </a:tr>
+              <a:tr h="370840">
+                <a:tc>
+                  <a:txBody>
+                    <a:bodyPr/>
+                    <a:lstStyle/>
+                    <a:p>
+                      <a:pPr algn="ctr"/>
+                      <a:r>
+                        <a:rPr lang="en-GB" b="1" dirty="0"/>
+                        <a:t>1</a:t>
+                      </a:r>
+                    </a:p>
+                  </a:txBody>
+                  <a:tcPr/>
+                </a:tc>
+                <a:tc>
+                  <a:txBody>
+                    <a:bodyPr/>
+                    <a:lstStyle/>
+                    <a:p>
+                      <a:pPr algn="ctr"/>
+                      <a:r>
+                        <a:rPr lang="en-GB" dirty="0"/>
+                        <a:t>9.Fev</a:t>
+                      </a:r>
+                    </a:p>
+                  </a:txBody>
+                  <a:tcPr anchor="ctr"/>
+                </a:tc>
+                <a:tc>
+                  <a:txBody>
+                    <a:bodyPr/>
+                    <a:lstStyle/>
+                    <a:p>
+                      <a:pPr marL="285750" indent="-285750">
+                        <a:buFont typeface="Arial" panose="020B0604020202020204" pitchFamily="34" charset="0"/>
+                        <a:buChar char="•"/>
+                      </a:pPr>
+                      <a:r>
+                        <a:rPr lang="en-GB" dirty="0" err="1"/>
+                        <a:t>Apresentação</a:t>
+                      </a:r>
+                      <a:endParaRPr lang="en-GB" dirty="0"/>
+                    </a:p>
+                    <a:p>
+                      <a:pPr marL="285750" indent="-285750">
+                        <a:buFont typeface="Arial" panose="020B0604020202020204" pitchFamily="34" charset="0"/>
+                        <a:buChar char="•"/>
+                      </a:pPr>
+                      <a:r>
+                        <a:rPr lang="en-GB" dirty="0" err="1"/>
+                        <a:t>Processamento</a:t>
+                      </a:r>
+                      <a:r>
+                        <a:rPr lang="en-GB" dirty="0"/>
+                        <a:t> de </a:t>
+                      </a:r>
+                      <a:r>
+                        <a:rPr lang="en-GB" dirty="0" err="1"/>
+                        <a:t>Imagem</a:t>
+                      </a:r>
+                      <a:endParaRPr lang="en-GB" dirty="0"/>
+                    </a:p>
+                    <a:p>
+                      <a:pPr marL="285750" indent="-285750">
+                        <a:buFont typeface="Arial" panose="020B0604020202020204" pitchFamily="34" charset="0"/>
+                        <a:buChar char="•"/>
+                      </a:pPr>
+                      <a:r>
+                        <a:rPr lang="en-GB" dirty="0" err="1"/>
+                        <a:t>Filtragem</a:t>
+                      </a:r>
+                      <a:r>
+                        <a:rPr lang="en-GB" dirty="0"/>
+                        <a:t> </a:t>
+                      </a:r>
+                      <a:r>
+                        <a:rPr lang="en-GB" dirty="0" err="1"/>
+                        <a:t>Espacial</a:t>
+                      </a:r>
+                      <a:endParaRPr lang="en-GB" dirty="0"/>
+                    </a:p>
+                  </a:txBody>
+                  <a:tcPr/>
+                </a:tc>
+                <a:extLst>
+                  <a:ext uri="{0D108BD9-81ED-4DB2-BD59-A6C34878D82A}">
+                    <a16:rowId xmlns:a16="http://schemas.microsoft.com/office/drawing/2014/main" val="1400324978"/>
+                  </a:ext>
+                </a:extLst>
+              </a:tr>
+              <a:tr h="370840">
+                <a:tc>
+                  <a:txBody>
+                    <a:bodyPr/>
+                    <a:lstStyle/>
+                    <a:p>
+                      <a:pPr algn="ctr"/>
+                      <a:r>
+                        <a:rPr lang="en-GB" b="1" dirty="0"/>
+                        <a:t>2</a:t>
+                      </a:r>
+                    </a:p>
+                  </a:txBody>
+                  <a:tcPr/>
+                </a:tc>
+                <a:tc>
+                  <a:txBody>
+                    <a:bodyPr/>
+                    <a:lstStyle/>
+                    <a:p>
+                      <a:pPr algn="ctr"/>
+                      <a:r>
+                        <a:rPr lang="en-GB" dirty="0"/>
+                        <a:t>16.Fev</a:t>
+                      </a:r>
+                    </a:p>
+                  </a:txBody>
+                  <a:tcPr anchor="ctr"/>
+                </a:tc>
+                <a:tc>
+                  <a:txBody>
+                    <a:bodyPr/>
+                    <a:lstStyle/>
+                    <a:p>
+                      <a:pPr marL="285750" indent="-285750">
+                        <a:buFont typeface="Arial" panose="020B0604020202020204" pitchFamily="34" charset="0"/>
+                        <a:buChar char="•"/>
+                      </a:pPr>
+                      <a:r>
+                        <a:rPr lang="en-GB" dirty="0" err="1"/>
+                        <a:t>Filtragem</a:t>
+                      </a:r>
+                      <a:r>
+                        <a:rPr lang="en-GB" dirty="0"/>
+                        <a:t> </a:t>
+                      </a:r>
+                      <a:r>
+                        <a:rPr lang="en-GB" dirty="0" err="1"/>
+                        <a:t>Espectral</a:t>
+                      </a:r>
+                      <a:endParaRPr lang="en-GB" dirty="0"/>
+                    </a:p>
+                  </a:txBody>
+                  <a:tcPr/>
+                </a:tc>
+                <a:extLst>
+                  <a:ext uri="{0D108BD9-81ED-4DB2-BD59-A6C34878D82A}">
+                    <a16:rowId xmlns:a16="http://schemas.microsoft.com/office/drawing/2014/main" val="1384492995"/>
+                  </a:ext>
+                </a:extLst>
+              </a:tr>
+              <a:tr h="370840">
+                <a:tc>
+                  <a:txBody>
+                    <a:bodyPr/>
+                    <a:lstStyle/>
+                    <a:p>
+                      <a:pPr algn="ctr"/>
+                      <a:r>
+                        <a:rPr lang="en-GB" b="1" dirty="0"/>
+                        <a:t>3</a:t>
+                      </a:r>
+                    </a:p>
+                  </a:txBody>
+                  <a:tcPr/>
+                </a:tc>
+                <a:tc>
+                  <a:txBody>
+                    <a:bodyPr/>
+                    <a:lstStyle/>
+                    <a:p>
+                      <a:pPr algn="ctr"/>
+                      <a:r>
+                        <a:rPr lang="en-GB" dirty="0"/>
+                        <a:t>23.Fev</a:t>
+                      </a:r>
+                    </a:p>
+                  </a:txBody>
+                  <a:tcPr anchor="ctr"/>
+                </a:tc>
+                <a:tc>
+                  <a:txBody>
+                    <a:bodyPr/>
+                    <a:lstStyle/>
+                    <a:p>
+                      <a:pPr marL="285750" indent="-285750">
+                        <a:buFont typeface="Arial" panose="020B0604020202020204" pitchFamily="34" charset="0"/>
+                        <a:buChar char="•"/>
+                      </a:pPr>
+                      <a:r>
+                        <a:rPr lang="en-GB" dirty="0" err="1"/>
+                        <a:t>Segmentação</a:t>
+                      </a:r>
+                      <a:endParaRPr lang="en-GB" dirty="0"/>
+                    </a:p>
+                  </a:txBody>
+                  <a:tcPr/>
+                </a:tc>
+                <a:extLst>
+                  <a:ext uri="{0D108BD9-81ED-4DB2-BD59-A6C34878D82A}">
+                    <a16:rowId xmlns:a16="http://schemas.microsoft.com/office/drawing/2014/main" val="3404577523"/>
+                  </a:ext>
+                </a:extLst>
+              </a:tr>
+              <a:tr h="370840">
+                <a:tc>
+                  <a:txBody>
+                    <a:bodyPr/>
+                    <a:lstStyle/>
+                    <a:p>
+                      <a:pPr algn="ctr"/>
+                      <a:r>
+                        <a:rPr lang="en-GB" b="1" dirty="0"/>
+                        <a:t>4</a:t>
+                      </a:r>
+                    </a:p>
+                  </a:txBody>
+                  <a:tcPr/>
+                </a:tc>
+                <a:tc>
+                  <a:txBody>
+                    <a:bodyPr/>
+                    <a:lstStyle/>
+                    <a:p>
+                      <a:pPr algn="ctr"/>
+                      <a:r>
+                        <a:rPr lang="en-GB" dirty="0"/>
+                        <a:t>1.Mar</a:t>
+                      </a:r>
+                    </a:p>
+                  </a:txBody>
+                  <a:tcPr anchor="ctr"/>
+                </a:tc>
+                <a:tc>
+                  <a:txBody>
+                    <a:bodyPr/>
+                    <a:lstStyle/>
+                    <a:p>
+                      <a:pPr marL="285750" indent="-285750">
+                        <a:buFont typeface="Arial" panose="020B0604020202020204" pitchFamily="34" charset="0"/>
+                        <a:buChar char="•"/>
+                      </a:pPr>
+                      <a:r>
+                        <a:rPr lang="en-GB" dirty="0" err="1"/>
+                        <a:t>Início</a:t>
+                      </a:r>
+                      <a:r>
+                        <a:rPr lang="en-GB" dirty="0"/>
+                        <a:t> </a:t>
+                      </a:r>
+                      <a:r>
+                        <a:rPr lang="en-GB" dirty="0" err="1"/>
+                        <a:t>Projecto</a:t>
+                      </a:r>
+                      <a:endParaRPr lang="en-GB" dirty="0"/>
+                    </a:p>
+                  </a:txBody>
+                  <a:tcPr/>
+                </a:tc>
+                <a:extLst>
+                  <a:ext uri="{0D108BD9-81ED-4DB2-BD59-A6C34878D82A}">
+                    <a16:rowId xmlns:a16="http://schemas.microsoft.com/office/drawing/2014/main" val="579304146"/>
+                  </a:ext>
+                </a:extLst>
+              </a:tr>
+              <a:tr h="370840">
+                <a:tc>
+                  <a:txBody>
+                    <a:bodyPr/>
+                    <a:lstStyle/>
+                    <a:p>
+                      <a:pPr algn="ctr"/>
+                      <a:r>
+                        <a:rPr lang="en-GB" b="1" dirty="0"/>
+                        <a:t>---</a:t>
+                      </a:r>
+                    </a:p>
+                  </a:txBody>
+                  <a:tcPr/>
+                </a:tc>
+                <a:tc>
+                  <a:txBody>
+                    <a:bodyPr/>
+                    <a:lstStyle/>
+                    <a:p>
+                      <a:pPr algn="ctr"/>
+                      <a:r>
+                        <a:rPr lang="en-GB" dirty="0"/>
+                        <a:t>7.Mar</a:t>
+                      </a:r>
+                    </a:p>
+                  </a:txBody>
+                  <a:tcPr anchor="ctr"/>
+                </a:tc>
+                <a:tc>
+                  <a:txBody>
+                    <a:bodyPr/>
+                    <a:lstStyle/>
+                    <a:p>
+                      <a:pPr marL="285750" indent="-285750">
+                        <a:buFont typeface="Arial" panose="020B0604020202020204" pitchFamily="34" charset="0"/>
+                        <a:buChar char="•"/>
+                      </a:pPr>
+                      <a:r>
+                        <a:rPr lang="en-GB" dirty="0" err="1"/>
+                        <a:t>Limite</a:t>
+                      </a:r>
+                      <a:r>
+                        <a:rPr lang="en-GB" dirty="0"/>
+                        <a:t> </a:t>
+                      </a:r>
+                      <a:r>
+                        <a:rPr lang="en-GB" dirty="0" err="1"/>
+                        <a:t>Submissão</a:t>
+                      </a:r>
+                      <a:r>
+                        <a:rPr lang="en-GB" dirty="0"/>
+                        <a:t> </a:t>
+                      </a:r>
+                      <a:r>
+                        <a:rPr lang="en-GB" dirty="0" err="1"/>
+                        <a:t>projecto</a:t>
+                      </a:r>
+                      <a:r>
+                        <a:rPr lang="en-GB" dirty="0"/>
+                        <a:t> no BB</a:t>
+                      </a:r>
+                    </a:p>
+                  </a:txBody>
+                  <a:tcPr/>
+                </a:tc>
+                <a:extLst>
+                  <a:ext uri="{0D108BD9-81ED-4DB2-BD59-A6C34878D82A}">
+                    <a16:rowId xmlns:a16="http://schemas.microsoft.com/office/drawing/2014/main" val="838879706"/>
+                  </a:ext>
+                </a:extLst>
+              </a:tr>
+            </a:tbl>
+          </a:graphicData>
+        </a:graphic>
+      </p:graphicFrame>
     </p:spTree>
     <p:extLst>
       <p:ext uri="{BB962C8B-B14F-4D97-AF65-F5344CB8AC3E}">
@@ -4378,29 +4698,56 @@
       </p:grpSpPr>
       <p:sp>
         <p:nvSpPr>
-          <p:cNvPr id="2" name="Título 1"/>
+          <p:cNvPr id="17409" name="Marcador de Posição do Número do Diapositivo 4"/>
           <p:cNvSpPr>
             <a:spLocks noGrp="1"/>
           </p:cNvSpPr>
           <p:nvPr>
-            <p:ph type="title"/>
-          </p:nvPr>
-        </p:nvSpPr>
-        <p:spPr/>
+            <p:ph type="sldNum" sz="quarter" idx="11"/>
+          </p:nvPr>
+        </p:nvSpPr>
+        <p:spPr>
+          <a:noFill/>
+        </p:spPr>
         <p:txBody>
           <a:bodyPr/>
           <a:lstStyle/>
           <a:p>
-            <a:r>
-              <a:rPr lang="pt-PT" dirty="0"/>
-              <a:t>Galeria</a:t>
-            </a:r>
-          </a:p>
-        </p:txBody>
-      </p:sp>
-      <p:sp>
-        <p:nvSpPr>
-          <p:cNvPr id="4" name="Marcador de Posição do Rodapé 3"/>
+            <a:fld id="{39BE7386-DBFC-4067-9680-1F92C978BD9B}" type="slidenum">
+              <a:rPr lang="pt-PT" smtClean="0"/>
+              <a:pPr/>
+              <a:t>3</a:t>
+            </a:fld>
+            <a:endParaRPr lang="pt-PT"/>
+          </a:p>
+        </p:txBody>
+      </p:sp>
+      <p:sp>
+        <p:nvSpPr>
+          <p:cNvPr id="17410" name="Rectangle 2"/>
+          <p:cNvSpPr>
+            <a:spLocks noGrp="1" noChangeArrowheads="1"/>
+          </p:cNvSpPr>
+          <p:nvPr>
+            <p:ph type="title"/>
+          </p:nvPr>
+        </p:nvSpPr>
+        <p:spPr/>
+        <p:txBody>
+          <a:bodyPr/>
+          <a:lstStyle/>
+          <a:p>
+            <a:pPr eaLnBrk="1" hangingPunct="1"/>
+            <a:r>
+              <a:rPr lang="en-GB"/>
+              <a:t>Bibliografia</a:t>
+            </a:r>
+          </a:p>
+        </p:txBody>
+      </p:sp>
+      <p:sp>
+        <p:nvSpPr>
+          <p:cNvPr id="6" name="Marcador de Posição do Rodapé 5"/>
           <p:cNvSpPr>
             <a:spLocks noGrp="1"/>
           </p:cNvSpPr>
@@ -4418,7 +4765,7 @@
             </a:pPr>
             <a:r>
               <a:rPr lang="en-US"/>
-              <a:t>Visualização e Iluminação</a:t>
+              <a:t>VC e Processamento de Imagem</a:t>
             </a:r>
             <a:endParaRPr lang="pt-PT"/>
           </a:p>
@@ -4426,412 +4773,348 @@
       </p:sp>
       <p:sp>
         <p:nvSpPr>
-          <p:cNvPr id="5" name="Marcador de Posição do Número do Diapositivo 4"/>
-          <p:cNvSpPr>
-            <a:spLocks noGrp="1"/>
-          </p:cNvSpPr>
-          <p:nvPr>
-            <p:ph type="sldNum" sz="quarter" idx="11"/>
-          </p:nvPr>
-        </p:nvSpPr>
-        <p:spPr/>
-        <p:txBody>
-          <a:bodyPr/>
-          <a:lstStyle/>
-          <a:p>
-            <a:pPr>
-              <a:defRPr/>
+          <p:cNvPr id="4" name="Marcador de Posição de Conteúdo 2">
+            <a:extLst>
+              <a:ext uri="{FF2B5EF4-FFF2-40B4-BE49-F238E27FC236}">
+                <a16:creationId xmlns:a16="http://schemas.microsoft.com/office/drawing/2014/main" id="{8298AED9-D76A-F7C6-3640-6B5886AF6CF8}"/>
+              </a:ext>
+            </a:extLst>
+          </p:cNvPr>
+          <p:cNvSpPr txBox="1">
+            <a:spLocks/>
+          </p:cNvSpPr>
+          <p:nvPr/>
+        </p:nvSpPr>
+        <p:spPr bwMode="auto">
+          <a:xfrm>
+            <a:off x="3995937" y="1493838"/>
+            <a:ext cx="4848026" cy="4602162"/>
+          </a:xfrm>
+          <a:prstGeom prst="rect">
+            <a:avLst/>
+          </a:prstGeom>
+          <a:noFill/>
+          <a:ln w="9525">
+            <a:solidFill>
+              <a:schemeClr val="accent6">
+                <a:lumMod val="50000"/>
+              </a:schemeClr>
+            </a:solidFill>
+            <a:miter lim="800000"/>
+            <a:headEnd/>
+            <a:tailEnd/>
+          </a:ln>
+        </p:spPr>
+        <p:txBody>
+          <a:bodyPr vert="horz" wrap="square" lIns="91440" tIns="45720" rIns="91440" bIns="45720" numCol="1" anchor="t" anchorCtr="0" compatLnSpc="1">
+            <a:prstTxWarp prst="textNoShape">
+              <a:avLst/>
+            </a:prstTxWarp>
+          </a:bodyPr>
+          <a:lstStyle>
+            <a:lvl1pPr marL="342900" indent="-342900" algn="l" rtl="0" eaLnBrk="0" fontAlgn="base" hangingPunct="0">
+              <a:spcBef>
+                <a:spcPct val="20000"/>
+              </a:spcBef>
+              <a:spcAft>
+                <a:spcPct val="0"/>
+              </a:spcAft>
+              <a:buChar char="•"/>
+              <a:defRPr sz="2000">
+                <a:solidFill>
+                  <a:schemeClr val="tx1"/>
+                </a:solidFill>
+                <a:latin typeface="Calibri" pitchFamily="34" charset="0"/>
+                <a:ea typeface="+mn-ea"/>
+                <a:cs typeface="+mn-cs"/>
+              </a:defRPr>
+            </a:lvl1pPr>
+            <a:lvl2pPr marL="742950" indent="-285750" algn="l" rtl="0" eaLnBrk="0" fontAlgn="base" hangingPunct="0">
+              <a:spcBef>
+                <a:spcPct val="20000"/>
+              </a:spcBef>
+              <a:spcAft>
+                <a:spcPct val="0"/>
+              </a:spcAft>
+              <a:buChar char="–"/>
+              <a:defRPr>
+                <a:solidFill>
+                  <a:schemeClr val="tx1"/>
+                </a:solidFill>
+                <a:latin typeface="Calibri" pitchFamily="34" charset="0"/>
+              </a:defRPr>
+            </a:lvl2pPr>
+            <a:lvl3pPr marL="1143000" indent="-228600" algn="l" rtl="0" eaLnBrk="0" fontAlgn="base" hangingPunct="0">
+              <a:spcBef>
+                <a:spcPct val="20000"/>
+              </a:spcBef>
+              <a:spcAft>
+                <a:spcPct val="0"/>
+              </a:spcAft>
+              <a:buChar char="•"/>
+              <a:defRPr sz="1600">
+                <a:solidFill>
+                  <a:schemeClr val="tx1"/>
+                </a:solidFill>
+                <a:latin typeface="Calibri" pitchFamily="34" charset="0"/>
+              </a:defRPr>
+            </a:lvl3pPr>
+            <a:lvl4pPr marL="1600200" indent="-228600" algn="l" rtl="0" eaLnBrk="0" fontAlgn="base" hangingPunct="0">
+              <a:spcBef>
+                <a:spcPct val="20000"/>
+              </a:spcBef>
+              <a:spcAft>
+                <a:spcPct val="0"/>
+              </a:spcAft>
+              <a:buChar char="–"/>
+              <a:defRPr sz="1400">
+                <a:solidFill>
+                  <a:schemeClr val="tx1"/>
+                </a:solidFill>
+                <a:latin typeface="Calibri" pitchFamily="34" charset="0"/>
+              </a:defRPr>
+            </a:lvl4pPr>
+            <a:lvl5pPr marL="2057400" indent="-228600" algn="l" rtl="0" eaLnBrk="0" fontAlgn="base" hangingPunct="0">
+              <a:spcBef>
+                <a:spcPct val="20000"/>
+              </a:spcBef>
+              <a:spcAft>
+                <a:spcPct val="0"/>
+              </a:spcAft>
+              <a:buChar char="»"/>
+              <a:defRPr sz="1200">
+                <a:solidFill>
+                  <a:schemeClr val="tx1"/>
+                </a:solidFill>
+                <a:latin typeface="Calibri" pitchFamily="34" charset="0"/>
+              </a:defRPr>
+            </a:lvl5pPr>
+            <a:lvl6pPr marL="2514600" indent="-228600" algn="l" rtl="0" fontAlgn="base">
+              <a:spcBef>
+                <a:spcPct val="20000"/>
+              </a:spcBef>
+              <a:spcAft>
+                <a:spcPct val="0"/>
+              </a:spcAft>
+              <a:buChar char="»"/>
+              <a:defRPr sz="1200">
+                <a:solidFill>
+                  <a:schemeClr val="tx1"/>
+                </a:solidFill>
+                <a:latin typeface="+mn-lt"/>
+              </a:defRPr>
+            </a:lvl6pPr>
+            <a:lvl7pPr marL="2971800" indent="-228600" algn="l" rtl="0" fontAlgn="base">
+              <a:spcBef>
+                <a:spcPct val="20000"/>
+              </a:spcBef>
+              <a:spcAft>
+                <a:spcPct val="0"/>
+              </a:spcAft>
+              <a:buChar char="»"/>
+              <a:defRPr sz="1200">
+                <a:solidFill>
+                  <a:schemeClr val="tx1"/>
+                </a:solidFill>
+                <a:latin typeface="+mn-lt"/>
+              </a:defRPr>
+            </a:lvl7pPr>
+            <a:lvl8pPr marL="3429000" indent="-228600" algn="l" rtl="0" fontAlgn="base">
+              <a:spcBef>
+                <a:spcPct val="20000"/>
+              </a:spcBef>
+              <a:spcAft>
+                <a:spcPct val="0"/>
+              </a:spcAft>
+              <a:buChar char="»"/>
+              <a:defRPr sz="1200">
+                <a:solidFill>
+                  <a:schemeClr val="tx1"/>
+                </a:solidFill>
+                <a:latin typeface="+mn-lt"/>
+              </a:defRPr>
+            </a:lvl8pPr>
+            <a:lvl9pPr marL="3886200" indent="-228600" algn="l" rtl="0" fontAlgn="base">
+              <a:spcBef>
+                <a:spcPct val="20000"/>
+              </a:spcBef>
+              <a:spcAft>
+                <a:spcPct val="0"/>
+              </a:spcAft>
+              <a:buChar char="»"/>
+              <a:defRPr sz="1200">
+                <a:solidFill>
+                  <a:schemeClr val="tx1"/>
+                </a:solidFill>
+                <a:latin typeface="+mn-lt"/>
+              </a:defRPr>
+            </a:lvl9pPr>
+          </a:lstStyle>
+          <a:p>
+            <a:pPr marL="0" indent="0">
+              <a:buFontTx/>
+              <a:buNone/>
             </a:pPr>
-            <a:fld id="{1A9EFD02-FA88-4A3F-8747-37805FDDFCCF}" type="slidenum">
-              <a:rPr lang="pt-PT" smtClean="0"/>
-              <a:pPr>
-                <a:defRPr/>
-              </a:pPr>
-              <a:t>3</a:t>
-            </a:fld>
-            <a:endParaRPr lang="pt-PT"/>
+            <a:r>
+              <a:rPr lang="pt-PT" sz="1800" kern="0">
+                <a:latin typeface="+mn-lt"/>
+              </a:rPr>
+              <a:t>© 2008 by Pearson Education, Inc.</a:t>
+            </a:r>
+          </a:p>
+          <a:p>
+            <a:pPr marL="0" indent="0">
+              <a:buFontTx/>
+              <a:buNone/>
+            </a:pPr>
+            <a:r>
+              <a:rPr lang="pt-PT" sz="1800" kern="0">
+                <a:latin typeface="+mn-lt"/>
+              </a:rPr>
+              <a:t>Pearson Prentice Hall</a:t>
+            </a:r>
+          </a:p>
+          <a:p>
+            <a:pPr marL="0" indent="0">
+              <a:buFontTx/>
+              <a:buNone/>
+            </a:pPr>
+            <a:r>
+              <a:rPr lang="pt-PT" sz="1800" kern="0">
+                <a:latin typeface="+mn-lt"/>
+              </a:rPr>
+              <a:t>Pearson Education, Inc.</a:t>
+            </a:r>
+          </a:p>
+          <a:p>
+            <a:pPr marL="0" indent="0">
+              <a:buFontTx/>
+              <a:buNone/>
+            </a:pPr>
+            <a:r>
+              <a:rPr lang="pt-PT" sz="1800" kern="0">
+                <a:latin typeface="+mn-lt"/>
+              </a:rPr>
+              <a:t>Upper Saddle River, New Jersey 07458</a:t>
+            </a:r>
+          </a:p>
+          <a:p>
+            <a:pPr marL="0" indent="0">
+              <a:buFontTx/>
+              <a:buNone/>
+            </a:pPr>
+            <a:endParaRPr lang="pt-PT" sz="1800" kern="0">
+              <a:latin typeface="+mn-lt"/>
+            </a:endParaRPr>
+          </a:p>
+          <a:p>
+            <a:pPr marL="0" indent="0">
+              <a:buFontTx/>
+              <a:buNone/>
+            </a:pPr>
+            <a:r>
+              <a:rPr lang="pt-PT" sz="1800" kern="0">
+                <a:latin typeface="+mn-lt"/>
+              </a:rPr>
+              <a:t>ISBN 0-13-168728-x</a:t>
+            </a:r>
+          </a:p>
+          <a:p>
+            <a:pPr marL="0" indent="0">
+              <a:buFontTx/>
+              <a:buNone/>
+            </a:pPr>
+            <a:endParaRPr lang="pt-PT" sz="1800" kern="0">
+              <a:latin typeface="+mn-lt"/>
+            </a:endParaRPr>
+          </a:p>
+          <a:p>
+            <a:pPr marL="0" indent="0">
+              <a:buFontTx/>
+              <a:buNone/>
+            </a:pPr>
+            <a:r>
+              <a:rPr lang="pt-PT" sz="1600" kern="0">
+                <a:solidFill>
+                  <a:schemeClr val="accent6">
+                    <a:lumMod val="50000"/>
+                  </a:schemeClr>
+                </a:solidFill>
+                <a:latin typeface="+mn-lt"/>
+                <a:hlinkClick r:id="rId2">
+                  <a:extLst>
+                    <a:ext uri="{A12FA001-AC4F-418D-AE19-62706E023703}">
+                      <ahyp:hlinkClr xmlns:ahyp="http://schemas.microsoft.com/office/drawing/2018/hyperlinkcolor" val="tx"/>
+                    </a:ext>
+                  </a:extLst>
+                </a:hlinkClick>
+              </a:rPr>
+              <a:t>https://www.imageprocessingplace.com/</a:t>
+            </a:r>
+            <a:endParaRPr lang="pt-PT" sz="1600" kern="0">
+              <a:solidFill>
+                <a:schemeClr val="accent6">
+                  <a:lumMod val="50000"/>
+                </a:schemeClr>
+              </a:solidFill>
+              <a:latin typeface="+mn-lt"/>
+            </a:endParaRPr>
+          </a:p>
+          <a:p>
+            <a:pPr marL="0" indent="0">
+              <a:buFontTx/>
+              <a:buNone/>
+            </a:pPr>
+            <a:endParaRPr lang="pt-PT" sz="1800" kern="0">
+              <a:latin typeface="+mn-lt"/>
+            </a:endParaRPr>
+          </a:p>
+          <a:p>
+            <a:pPr marL="0" indent="0">
+              <a:buFontTx/>
+              <a:buNone/>
+            </a:pPr>
+            <a:endParaRPr lang="en-GB" sz="1800" kern="0" dirty="0">
+              <a:latin typeface="+mn-lt"/>
+            </a:endParaRPr>
           </a:p>
         </p:txBody>
       </p:sp>
       <p:pic>
         <p:nvPicPr>
-          <p:cNvPr id="6" name="Imagem 5"/>
+          <p:cNvPr id="5" name="Imagem 4">
+            <a:extLst>
+              <a:ext uri="{FF2B5EF4-FFF2-40B4-BE49-F238E27FC236}">
+                <a16:creationId xmlns:a16="http://schemas.microsoft.com/office/drawing/2014/main" id="{C3596A99-4551-0386-58D1-E8B778F03480}"/>
+              </a:ext>
+            </a:extLst>
+          </p:cNvPr>
           <p:cNvPicPr>
             <a:picLocks noChangeAspect="1"/>
           </p:cNvPicPr>
           <p:nvPr/>
         </p:nvPicPr>
         <p:blipFill>
-          <a:blip r:embed="rId2">
-            <a:extLst>
-              <a:ext uri="{28A0092B-C50C-407E-A947-70E740481C1C}">
-                <a14:useLocalDpi xmlns:a14="http://schemas.microsoft.com/office/drawing/2010/main" val="0"/>
-              </a:ext>
-            </a:extLst>
-          </a:blip>
+          <a:blip r:embed="rId3"/>
           <a:stretch>
             <a:fillRect/>
           </a:stretch>
         </p:blipFill>
         <p:spPr>
           <a:xfrm>
-            <a:off x="4463988" y="595310"/>
-            <a:ext cx="3829050" cy="5715000"/>
+            <a:off x="611560" y="1658944"/>
+            <a:ext cx="3097365" cy="4271950"/>
           </a:xfrm>
           <a:prstGeom prst="rect">
             <a:avLst/>
           </a:prstGeom>
         </p:spPr>
       </p:pic>
-      <p:grpSp>
-        <p:nvGrpSpPr>
-          <p:cNvPr id="10" name="Grupo 9"/>
-          <p:cNvGrpSpPr/>
-          <p:nvPr/>
-        </p:nvGrpSpPr>
-        <p:grpSpPr>
-          <a:xfrm>
-            <a:off x="431540" y="2744924"/>
-            <a:ext cx="5946973" cy="707886"/>
-            <a:chOff x="431540" y="2744924"/>
-            <a:chExt cx="5946973" cy="707886"/>
-          </a:xfrm>
-        </p:grpSpPr>
-        <p:sp>
-          <p:nvSpPr>
-            <p:cNvPr id="7" name="CaixaDeTexto 6"/>
-            <p:cNvSpPr txBox="1"/>
-            <p:nvPr/>
-          </p:nvSpPr>
-          <p:spPr>
-            <a:xfrm>
-              <a:off x="431540" y="2744924"/>
-              <a:ext cx="1359796" cy="707886"/>
-            </a:xfrm>
-            <a:prstGeom prst="rect">
-              <a:avLst/>
-            </a:prstGeom>
-            <a:noFill/>
-            <a:ln w="19050">
-              <a:solidFill>
-                <a:srgbClr val="006600"/>
-              </a:solidFill>
-            </a:ln>
-          </p:spPr>
-          <p:txBody>
-            <a:bodyPr wrap="none" rtlCol="0">
-              <a:spAutoFit/>
-            </a:bodyPr>
-            <a:lstStyle/>
-            <a:p>
-              <a:r>
-                <a:rPr lang="pt-PT" sz="2000" b="1" dirty="0">
-                  <a:solidFill>
-                    <a:srgbClr val="006600"/>
-                  </a:solidFill>
-                  <a:latin typeface="Calibri" panose="020F0502020204030204" pitchFamily="34" charset="0"/>
-                </a:rPr>
-                <a:t>Iluminação</a:t>
-              </a:r>
-            </a:p>
-            <a:p>
-              <a:r>
-                <a:rPr lang="pt-PT" sz="2000" b="1" dirty="0">
-                  <a:solidFill>
-                    <a:srgbClr val="006600"/>
-                  </a:solidFill>
-                  <a:latin typeface="Calibri" panose="020F0502020204030204" pitchFamily="34" charset="0"/>
-                </a:rPr>
-                <a:t>directa</a:t>
-              </a:r>
-            </a:p>
-          </p:txBody>
-        </p:sp>
-        <p:cxnSp>
-          <p:nvCxnSpPr>
-            <p:cNvPr id="9" name="Conexão recta unidireccional 8"/>
-            <p:cNvCxnSpPr>
-              <a:endCxn id="7" idx="3"/>
-            </p:cNvCxnSpPr>
-            <p:nvPr/>
-          </p:nvCxnSpPr>
-          <p:spPr>
-            <a:xfrm flipH="1">
-              <a:off x="1791336" y="3098867"/>
-              <a:ext cx="4587177" cy="0"/>
-            </a:xfrm>
-            <a:prstGeom prst="straightConnector1">
-              <a:avLst/>
-            </a:prstGeom>
-            <a:ln w="19050">
-              <a:solidFill>
-                <a:srgbClr val="006600"/>
-              </a:solidFill>
-              <a:headEnd type="oval" w="lg" len="med"/>
-              <a:tailEnd type="arrow"/>
-            </a:ln>
-          </p:spPr>
-          <p:style>
-            <a:lnRef idx="1">
-              <a:schemeClr val="accent1"/>
-            </a:lnRef>
-            <a:fillRef idx="0">
-              <a:schemeClr val="accent1"/>
-            </a:fillRef>
-            <a:effectRef idx="0">
-              <a:schemeClr val="accent1"/>
-            </a:effectRef>
-            <a:fontRef idx="minor">
-              <a:schemeClr val="tx1"/>
-            </a:fontRef>
-          </p:style>
-        </p:cxnSp>
-      </p:grpSp>
-      <p:grpSp>
-        <p:nvGrpSpPr>
-          <p:cNvPr id="11" name="Grupo 10"/>
-          <p:cNvGrpSpPr/>
-          <p:nvPr/>
-        </p:nvGrpSpPr>
-        <p:grpSpPr>
-          <a:xfrm>
-            <a:off x="450223" y="3176972"/>
-            <a:ext cx="7686173" cy="2455823"/>
-            <a:chOff x="431540" y="1304764"/>
-            <a:chExt cx="7686173" cy="2455823"/>
-          </a:xfrm>
-        </p:grpSpPr>
-        <p:sp>
-          <p:nvSpPr>
-            <p:cNvPr id="12" name="CaixaDeTexto 11"/>
-            <p:cNvSpPr txBox="1"/>
-            <p:nvPr/>
-          </p:nvSpPr>
-          <p:spPr>
-            <a:xfrm>
-              <a:off x="431540" y="2744924"/>
-              <a:ext cx="1359796" cy="1015663"/>
-            </a:xfrm>
-            <a:prstGeom prst="rect">
-              <a:avLst/>
-            </a:prstGeom>
-            <a:noFill/>
-            <a:ln w="19050">
-              <a:solidFill>
-                <a:srgbClr val="006600"/>
-              </a:solidFill>
-            </a:ln>
-          </p:spPr>
-          <p:txBody>
-            <a:bodyPr wrap="none" rtlCol="0">
-              <a:spAutoFit/>
-            </a:bodyPr>
-            <a:lstStyle/>
-            <a:p>
-              <a:r>
-                <a:rPr lang="pt-PT" sz="2000" b="1" dirty="0">
-                  <a:solidFill>
-                    <a:srgbClr val="006600"/>
-                  </a:solidFill>
-                  <a:latin typeface="Calibri" panose="020F0502020204030204" pitchFamily="34" charset="0"/>
-                </a:rPr>
-                <a:t>Iluminação</a:t>
-              </a:r>
-            </a:p>
-            <a:p>
-              <a:r>
-                <a:rPr lang="pt-PT" sz="2000" b="1" dirty="0">
-                  <a:solidFill>
-                    <a:srgbClr val="006600"/>
-                  </a:solidFill>
-                  <a:latin typeface="Calibri" panose="020F0502020204030204" pitchFamily="34" charset="0"/>
-                </a:rPr>
-                <a:t>indirecta</a:t>
-              </a:r>
-            </a:p>
-            <a:p>
-              <a:r>
-                <a:rPr lang="pt-PT" sz="2000" b="1" dirty="0">
-                  <a:solidFill>
-                    <a:srgbClr val="006600"/>
-                  </a:solidFill>
-                  <a:latin typeface="Calibri" panose="020F0502020204030204" pitchFamily="34" charset="0"/>
-                </a:rPr>
-                <a:t>difusa</a:t>
-              </a:r>
-            </a:p>
-          </p:txBody>
-        </p:sp>
-        <p:cxnSp>
-          <p:nvCxnSpPr>
-            <p:cNvPr id="13" name="Conexão recta unidireccional 12"/>
-            <p:cNvCxnSpPr>
-              <a:endCxn id="12" idx="3"/>
-            </p:cNvCxnSpPr>
-            <p:nvPr/>
-          </p:nvCxnSpPr>
-          <p:spPr>
-            <a:xfrm flipH="1">
-              <a:off x="1791336" y="1304764"/>
-              <a:ext cx="6326377" cy="1947992"/>
-            </a:xfrm>
-            <a:prstGeom prst="straightConnector1">
-              <a:avLst/>
-            </a:prstGeom>
-            <a:ln w="19050">
-              <a:solidFill>
-                <a:srgbClr val="006600"/>
-              </a:solidFill>
-              <a:headEnd type="oval" w="lg" len="med"/>
-              <a:tailEnd type="arrow"/>
-            </a:ln>
-          </p:spPr>
-          <p:style>
-            <a:lnRef idx="1">
-              <a:schemeClr val="accent1"/>
-            </a:lnRef>
-            <a:fillRef idx="0">
-              <a:schemeClr val="accent1"/>
-            </a:fillRef>
-            <a:effectRef idx="0">
-              <a:schemeClr val="accent1"/>
-            </a:effectRef>
-            <a:fontRef idx="minor">
-              <a:schemeClr val="tx1"/>
-            </a:fontRef>
-          </p:style>
-        </p:cxnSp>
-      </p:grpSp>
     </p:spTree>
-    <p:extLst>
-      <p:ext uri="{BB962C8B-B14F-4D97-AF65-F5344CB8AC3E}">
-        <p14:creationId xmlns:p14="http://schemas.microsoft.com/office/powerpoint/2010/main" val="2102697176"/>
-      </p:ext>
-    </p:extLst>
   </p:cSld>
   <p:clrMapOvr>
     <a:masterClrMapping/>
   </p:clrMapOvr>
-  <p:timing>
-    <p:tnLst>
-      <p:par>
-        <p:cTn id="1" dur="indefinite" restart="never" nodeType="tmRoot">
-          <p:childTnLst>
-            <p:seq concurrent="1" nextAc="seek">
-              <p:cTn id="2" dur="indefinite" nodeType="mainSeq">
-                <p:childTnLst>
-                  <p:par>
-                    <p:cTn id="3" fill="hold">
-                      <p:stCondLst>
-                        <p:cond delay="indefinite"/>
-                      </p:stCondLst>
-                      <p:childTnLst>
-                        <p:par>
-                          <p:cTn id="4" fill="hold">
-                            <p:stCondLst>
-                              <p:cond delay="0"/>
-                            </p:stCondLst>
-                            <p:childTnLst>
-                              <p:par>
-                                <p:cTn id="5" presetID="1" presetClass="entr" presetSubtype="0" fill="hold" nodeType="clickEffect">
-                                  <p:stCondLst>
-                                    <p:cond delay="0"/>
-                                  </p:stCondLst>
-                                  <p:childTnLst>
-                                    <p:set>
-                                      <p:cBhvr>
-                                        <p:cTn id="6" dur="1" fill="hold">
-                                          <p:stCondLst>
-                                            <p:cond delay="0"/>
-                                          </p:stCondLst>
-                                        </p:cTn>
-                                        <p:tgtEl>
-                                          <p:spTgt spid="10"/>
-                                        </p:tgtEl>
-                                        <p:attrNameLst>
-                                          <p:attrName>style.visibility</p:attrName>
-                                        </p:attrNameLst>
-                                      </p:cBhvr>
-                                      <p:to>
-                                        <p:strVal val="visible"/>
-                                      </p:to>
-                                    </p:set>
-                                  </p:childTnLst>
-                                </p:cTn>
-                              </p:par>
-                            </p:childTnLst>
-                          </p:cTn>
-                        </p:par>
-                      </p:childTnLst>
-                    </p:cTn>
-                  </p:par>
-                  <p:par>
-                    <p:cTn id="7" fill="hold">
-                      <p:stCondLst>
-                        <p:cond delay="indefinite"/>
-                      </p:stCondLst>
-                      <p:childTnLst>
-                        <p:par>
-                          <p:cTn id="8" fill="hold">
-                            <p:stCondLst>
-                              <p:cond delay="0"/>
-                            </p:stCondLst>
-                            <p:childTnLst>
-                              <p:par>
-                                <p:cTn id="9" presetID="1" presetClass="entr" presetSubtype="0" fill="hold" nodeType="clickEffect">
-                                  <p:stCondLst>
-                                    <p:cond delay="0"/>
-                                  </p:stCondLst>
-                                  <p:childTnLst>
-                                    <p:set>
-                                      <p:cBhvr>
-                                        <p:cTn id="10" dur="1" fill="hold">
-                                          <p:stCondLst>
-                                            <p:cond delay="0"/>
-                                          </p:stCondLst>
-                                        </p:cTn>
-                                        <p:tgtEl>
-                                          <p:spTgt spid="11"/>
-                                        </p:tgtEl>
-                                        <p:attrNameLst>
-                                          <p:attrName>style.visibility</p:attrName>
-                                        </p:attrNameLst>
-                                      </p:cBhvr>
-                                      <p:to>
-                                        <p:strVal val="visible"/>
-                                      </p:to>
-                                    </p:set>
-                                  </p:childTnLst>
-                                </p:cTn>
-                              </p:par>
-                            </p:childTnLst>
-                          </p:cTn>
-                        </p:par>
-                      </p:childTnLst>
-                    </p:cTn>
-                  </p:par>
-                </p:childTnLst>
-              </p:cTn>
-              <p:prevCondLst>
-                <p:cond evt="onPrev" delay="0">
-                  <p:tgtEl>
-                    <p:sldTgt/>
-                  </p:tgtEl>
-                </p:cond>
-              </p:prevCondLst>
-              <p:nextCondLst>
-                <p:cond evt="onNext" delay="0">
-                  <p:tgtEl>
-                    <p:sldTgt/>
-                  </p:tgtEl>
-                </p:cond>
-              </p:nextCondLst>
-            </p:seq>
-          </p:childTnLst>
-        </p:cTn>
-      </p:par>
-    </p:tnLst>
-  </p:timing>
 </p:sld>
 </file>
 
@@ -4854,764 +5137,7 @@
       </p:grpSpPr>
       <p:sp>
         <p:nvSpPr>
-          <p:cNvPr id="2" name="Título 1"/>
-          <p:cNvSpPr>
-            <a:spLocks noGrp="1"/>
-          </p:cNvSpPr>
-          <p:nvPr>
-            <p:ph type="title"/>
-          </p:nvPr>
-        </p:nvSpPr>
-        <p:spPr/>
-        <p:txBody>
-          <a:bodyPr/>
-          <a:lstStyle/>
-          <a:p>
-            <a:r>
-              <a:rPr lang="pt-PT" dirty="0"/>
-              <a:t>Galeria</a:t>
-            </a:r>
-          </a:p>
-        </p:txBody>
-      </p:sp>
-      <p:pic>
-        <p:nvPicPr>
-          <p:cNvPr id="6" name="Marcador de Posição de Conteúdo 5"/>
-          <p:cNvPicPr>
-            <a:picLocks noGrp="1" noChangeAspect="1"/>
-          </p:cNvPicPr>
-          <p:nvPr>
-            <p:ph idx="1"/>
-          </p:nvPr>
-        </p:nvPicPr>
-        <p:blipFill>
-          <a:blip r:embed="rId2">
-            <a:extLst>
-              <a:ext uri="{28A0092B-C50C-407E-A947-70E740481C1C}">
-                <a14:useLocalDpi xmlns:a14="http://schemas.microsoft.com/office/drawing/2010/main" val="0"/>
-              </a:ext>
-            </a:extLst>
-          </a:blip>
-          <a:stretch>
-            <a:fillRect/>
-          </a:stretch>
-        </p:blipFill>
-        <p:spPr>
-          <a:xfrm>
-            <a:off x="1511660" y="1448780"/>
-            <a:ext cx="6136216" cy="4602162"/>
-          </a:xfrm>
-        </p:spPr>
-      </p:pic>
-      <p:sp>
-        <p:nvSpPr>
-          <p:cNvPr id="4" name="Marcador de Posição do Rodapé 3"/>
-          <p:cNvSpPr>
-            <a:spLocks noGrp="1"/>
-          </p:cNvSpPr>
-          <p:nvPr>
-            <p:ph type="ftr" sz="quarter" idx="10"/>
-          </p:nvPr>
-        </p:nvSpPr>
-        <p:spPr/>
-        <p:txBody>
-          <a:bodyPr/>
-          <a:lstStyle/>
-          <a:p>
-            <a:pPr>
-              <a:defRPr/>
-            </a:pPr>
-            <a:r>
-              <a:rPr lang="en-US"/>
-              <a:t>Visualização e Iluminação</a:t>
-            </a:r>
-            <a:endParaRPr lang="pt-PT"/>
-          </a:p>
-        </p:txBody>
-      </p:sp>
-      <p:sp>
-        <p:nvSpPr>
-          <p:cNvPr id="5" name="Marcador de Posição do Número do Diapositivo 4"/>
-          <p:cNvSpPr>
-            <a:spLocks noGrp="1"/>
-          </p:cNvSpPr>
-          <p:nvPr>
-            <p:ph type="sldNum" sz="quarter" idx="11"/>
-          </p:nvPr>
-        </p:nvSpPr>
-        <p:spPr/>
-        <p:txBody>
-          <a:bodyPr/>
-          <a:lstStyle/>
-          <a:p>
-            <a:pPr>
-              <a:defRPr/>
-            </a:pPr>
-            <a:fld id="{1A9EFD02-FA88-4A3F-8747-37805FDDFCCF}" type="slidenum">
-              <a:rPr lang="pt-PT" smtClean="0"/>
-              <a:pPr>
-                <a:defRPr/>
-              </a:pPr>
-              <a:t>4</a:t>
-            </a:fld>
-            <a:endParaRPr lang="pt-PT"/>
-          </a:p>
-        </p:txBody>
-      </p:sp>
-      <p:grpSp>
-        <p:nvGrpSpPr>
-          <p:cNvPr id="7" name="Grupo 6"/>
-          <p:cNvGrpSpPr/>
-          <p:nvPr/>
-        </p:nvGrpSpPr>
-        <p:grpSpPr>
-          <a:xfrm>
-            <a:off x="179512" y="1556792"/>
-            <a:ext cx="2592288" cy="3132348"/>
-            <a:chOff x="431540" y="2744924"/>
-            <a:chExt cx="2592288" cy="3132348"/>
-          </a:xfrm>
-        </p:grpSpPr>
-        <p:sp>
-          <p:nvSpPr>
-            <p:cNvPr id="8" name="CaixaDeTexto 7"/>
-            <p:cNvSpPr txBox="1"/>
-            <p:nvPr/>
-          </p:nvSpPr>
-          <p:spPr>
-            <a:xfrm>
-              <a:off x="431540" y="2744924"/>
-              <a:ext cx="1206228" cy="707886"/>
-            </a:xfrm>
-            <a:prstGeom prst="rect">
-              <a:avLst/>
-            </a:prstGeom>
-            <a:noFill/>
-            <a:ln w="19050">
-              <a:solidFill>
-                <a:srgbClr val="006600"/>
-              </a:solidFill>
-            </a:ln>
-          </p:spPr>
-          <p:txBody>
-            <a:bodyPr wrap="none" rtlCol="0">
-              <a:spAutoFit/>
-            </a:bodyPr>
-            <a:lstStyle/>
-            <a:p>
-              <a:r>
-                <a:rPr lang="pt-PT" sz="2000" b="1" dirty="0">
-                  <a:solidFill>
-                    <a:srgbClr val="006600"/>
-                  </a:solidFill>
-                  <a:latin typeface="Calibri" panose="020F0502020204030204" pitchFamily="34" charset="0"/>
-                </a:rPr>
-                <a:t>Reflexões</a:t>
-              </a:r>
-            </a:p>
-            <a:p>
-              <a:r>
-                <a:rPr lang="pt-PT" sz="2000" b="1" dirty="0" err="1">
-                  <a:solidFill>
-                    <a:srgbClr val="006600"/>
-                  </a:solidFill>
-                  <a:latin typeface="Calibri" panose="020F0502020204030204" pitchFamily="34" charset="0"/>
-                </a:rPr>
-                <a:t>Glossy</a:t>
-              </a:r>
-              <a:endParaRPr lang="pt-PT" sz="2000" b="1" dirty="0">
-                <a:solidFill>
-                  <a:srgbClr val="006600"/>
-                </a:solidFill>
-                <a:latin typeface="Calibri" panose="020F0502020204030204" pitchFamily="34" charset="0"/>
-              </a:endParaRPr>
-            </a:p>
-          </p:txBody>
-        </p:sp>
-        <p:cxnSp>
-          <p:nvCxnSpPr>
-            <p:cNvPr id="9" name="Conexão recta unidireccional 8"/>
-            <p:cNvCxnSpPr>
-              <a:endCxn id="8" idx="3"/>
-            </p:cNvCxnSpPr>
-            <p:nvPr/>
-          </p:nvCxnSpPr>
-          <p:spPr>
-            <a:xfrm flipH="1" flipV="1">
-              <a:off x="1637768" y="3098867"/>
-              <a:ext cx="1386060" cy="2778405"/>
-            </a:xfrm>
-            <a:prstGeom prst="straightConnector1">
-              <a:avLst/>
-            </a:prstGeom>
-            <a:ln w="19050">
-              <a:solidFill>
-                <a:srgbClr val="006600"/>
-              </a:solidFill>
-              <a:headEnd type="oval" w="lg" len="med"/>
-              <a:tailEnd type="arrow"/>
-            </a:ln>
-          </p:spPr>
-          <p:style>
-            <a:lnRef idx="1">
-              <a:schemeClr val="accent1"/>
-            </a:lnRef>
-            <a:fillRef idx="0">
-              <a:schemeClr val="accent1"/>
-            </a:fillRef>
-            <a:effectRef idx="0">
-              <a:schemeClr val="accent1"/>
-            </a:effectRef>
-            <a:fontRef idx="minor">
-              <a:schemeClr val="tx1"/>
-            </a:fontRef>
-          </p:style>
-        </p:cxnSp>
-      </p:grpSp>
-      <p:grpSp>
-        <p:nvGrpSpPr>
-          <p:cNvPr id="11" name="Grupo 10"/>
-          <p:cNvGrpSpPr/>
-          <p:nvPr/>
-        </p:nvGrpSpPr>
-        <p:grpSpPr>
-          <a:xfrm>
-            <a:off x="251520" y="4905164"/>
-            <a:ext cx="2880320" cy="868162"/>
-            <a:chOff x="431540" y="2276872"/>
-            <a:chExt cx="2880320" cy="868162"/>
-          </a:xfrm>
-        </p:grpSpPr>
-        <p:sp>
-          <p:nvSpPr>
-            <p:cNvPr id="12" name="CaixaDeTexto 11"/>
-            <p:cNvSpPr txBox="1"/>
-            <p:nvPr/>
-          </p:nvSpPr>
-          <p:spPr>
-            <a:xfrm>
-              <a:off x="431540" y="2744924"/>
-              <a:ext cx="1068369" cy="400110"/>
-            </a:xfrm>
-            <a:prstGeom prst="rect">
-              <a:avLst/>
-            </a:prstGeom>
-            <a:noFill/>
-            <a:ln w="19050">
-              <a:solidFill>
-                <a:srgbClr val="006600"/>
-              </a:solidFill>
-            </a:ln>
-          </p:spPr>
-          <p:txBody>
-            <a:bodyPr wrap="none" rtlCol="0">
-              <a:spAutoFit/>
-            </a:bodyPr>
-            <a:lstStyle/>
-            <a:p>
-              <a:r>
-                <a:rPr lang="pt-PT" sz="2000" b="1" dirty="0">
-                  <a:solidFill>
-                    <a:srgbClr val="006600"/>
-                  </a:solidFill>
-                  <a:latin typeface="Calibri" panose="020F0502020204030204" pitchFamily="34" charset="0"/>
-                </a:rPr>
-                <a:t>Cáustica</a:t>
-              </a:r>
-            </a:p>
-          </p:txBody>
-        </p:sp>
-        <p:cxnSp>
-          <p:nvCxnSpPr>
-            <p:cNvPr id="13" name="Conexão recta unidireccional 12"/>
-            <p:cNvCxnSpPr>
-              <a:endCxn id="12" idx="3"/>
-            </p:cNvCxnSpPr>
-            <p:nvPr/>
-          </p:nvCxnSpPr>
-          <p:spPr>
-            <a:xfrm flipH="1">
-              <a:off x="1499909" y="2276872"/>
-              <a:ext cx="1811951" cy="668107"/>
-            </a:xfrm>
-            <a:prstGeom prst="straightConnector1">
-              <a:avLst/>
-            </a:prstGeom>
-            <a:ln w="19050">
-              <a:solidFill>
-                <a:srgbClr val="006600"/>
-              </a:solidFill>
-              <a:headEnd type="oval" w="lg" len="med"/>
-              <a:tailEnd type="arrow"/>
-            </a:ln>
-          </p:spPr>
-          <p:style>
-            <a:lnRef idx="1">
-              <a:schemeClr val="accent1"/>
-            </a:lnRef>
-            <a:fillRef idx="0">
-              <a:schemeClr val="accent1"/>
-            </a:fillRef>
-            <a:effectRef idx="0">
-              <a:schemeClr val="accent1"/>
-            </a:effectRef>
-            <a:fontRef idx="minor">
-              <a:schemeClr val="tx1"/>
-            </a:fontRef>
-          </p:style>
-        </p:cxnSp>
-      </p:grpSp>
-      <p:grpSp>
-        <p:nvGrpSpPr>
-          <p:cNvPr id="17" name="Grupo 16"/>
-          <p:cNvGrpSpPr/>
-          <p:nvPr/>
-        </p:nvGrpSpPr>
-        <p:grpSpPr>
-          <a:xfrm>
-            <a:off x="3023828" y="2899827"/>
-            <a:ext cx="6002357" cy="1573289"/>
-            <a:chOff x="-4320988" y="2744924"/>
-            <a:chExt cx="6002357" cy="1573289"/>
-          </a:xfrm>
-        </p:grpSpPr>
-        <p:sp>
-          <p:nvSpPr>
-            <p:cNvPr id="18" name="CaixaDeTexto 17"/>
-            <p:cNvSpPr txBox="1"/>
-            <p:nvPr/>
-          </p:nvSpPr>
-          <p:spPr>
-            <a:xfrm>
-              <a:off x="431540" y="2744924"/>
-              <a:ext cx="1249829" cy="707886"/>
-            </a:xfrm>
-            <a:prstGeom prst="rect">
-              <a:avLst/>
-            </a:prstGeom>
-            <a:noFill/>
-            <a:ln w="19050">
-              <a:solidFill>
-                <a:srgbClr val="006600"/>
-              </a:solidFill>
-            </a:ln>
-          </p:spPr>
-          <p:txBody>
-            <a:bodyPr wrap="none" rtlCol="0">
-              <a:spAutoFit/>
-            </a:bodyPr>
-            <a:lstStyle/>
-            <a:p>
-              <a:r>
-                <a:rPr lang="pt-PT" sz="2000" b="1" dirty="0">
-                  <a:solidFill>
-                    <a:srgbClr val="006600"/>
-                  </a:solidFill>
-                  <a:latin typeface="Calibri" panose="020F0502020204030204" pitchFamily="34" charset="0"/>
-                </a:rPr>
-                <a:t>Cáustica</a:t>
-              </a:r>
-            </a:p>
-            <a:p>
-              <a:r>
-                <a:rPr lang="pt-PT" sz="2000" b="1" dirty="0">
-                  <a:solidFill>
-                    <a:srgbClr val="006600"/>
-                  </a:solidFill>
-                  <a:latin typeface="Calibri" panose="020F0502020204030204" pitchFamily="34" charset="0"/>
-                </a:rPr>
-                <a:t>Reflectida</a:t>
-              </a:r>
-            </a:p>
-          </p:txBody>
-        </p:sp>
-        <p:cxnSp>
-          <p:nvCxnSpPr>
-            <p:cNvPr id="19" name="Conexão recta unidireccional 18"/>
-            <p:cNvCxnSpPr>
-              <a:endCxn id="18" idx="1"/>
-            </p:cNvCxnSpPr>
-            <p:nvPr/>
-          </p:nvCxnSpPr>
-          <p:spPr>
-            <a:xfrm flipV="1">
-              <a:off x="-4320988" y="3098867"/>
-              <a:ext cx="4752528" cy="1219346"/>
-            </a:xfrm>
-            <a:prstGeom prst="straightConnector1">
-              <a:avLst/>
-            </a:prstGeom>
-            <a:ln w="19050">
-              <a:solidFill>
-                <a:srgbClr val="006600"/>
-              </a:solidFill>
-              <a:headEnd type="oval" w="lg" len="med"/>
-              <a:tailEnd type="arrow"/>
-            </a:ln>
-          </p:spPr>
-          <p:style>
-            <a:lnRef idx="1">
-              <a:schemeClr val="accent1"/>
-            </a:lnRef>
-            <a:fillRef idx="0">
-              <a:schemeClr val="accent1"/>
-            </a:fillRef>
-            <a:effectRef idx="0">
-              <a:schemeClr val="accent1"/>
-            </a:effectRef>
-            <a:fontRef idx="minor">
-              <a:schemeClr val="tx1"/>
-            </a:fontRef>
-          </p:style>
-        </p:cxnSp>
-      </p:grpSp>
-      <p:grpSp>
-        <p:nvGrpSpPr>
-          <p:cNvPr id="15" name="Grupo 14"/>
-          <p:cNvGrpSpPr/>
-          <p:nvPr/>
-        </p:nvGrpSpPr>
-        <p:grpSpPr>
-          <a:xfrm>
-            <a:off x="3779912" y="1603683"/>
-            <a:ext cx="5202223" cy="1357265"/>
-            <a:chOff x="-3564904" y="2744924"/>
-            <a:chExt cx="5202223" cy="1357265"/>
-          </a:xfrm>
-        </p:grpSpPr>
-        <p:sp>
-          <p:nvSpPr>
-            <p:cNvPr id="16" name="CaixaDeTexto 15"/>
-            <p:cNvSpPr txBox="1"/>
-            <p:nvPr/>
-          </p:nvSpPr>
-          <p:spPr>
-            <a:xfrm>
-              <a:off x="431540" y="2744924"/>
-              <a:ext cx="1205779" cy="707886"/>
-            </a:xfrm>
-            <a:prstGeom prst="rect">
-              <a:avLst/>
-            </a:prstGeom>
-            <a:noFill/>
-            <a:ln w="19050">
-              <a:solidFill>
-                <a:srgbClr val="006600"/>
-              </a:solidFill>
-            </a:ln>
-          </p:spPr>
-          <p:txBody>
-            <a:bodyPr wrap="none" rtlCol="0">
-              <a:spAutoFit/>
-            </a:bodyPr>
-            <a:lstStyle/>
-            <a:p>
-              <a:r>
-                <a:rPr lang="pt-PT" sz="2000" b="1" dirty="0">
-                  <a:solidFill>
-                    <a:srgbClr val="006600"/>
-                  </a:solidFill>
-                  <a:latin typeface="Calibri" panose="020F0502020204030204" pitchFamily="34" charset="0"/>
-                </a:rPr>
-                <a:t>Reflexão </a:t>
-              </a:r>
-            </a:p>
-            <a:p>
-              <a:r>
-                <a:rPr lang="pt-PT" sz="2000" b="1" dirty="0">
-                  <a:solidFill>
-                    <a:srgbClr val="006600"/>
-                  </a:solidFill>
-                  <a:latin typeface="Calibri" panose="020F0502020204030204" pitchFamily="34" charset="0"/>
-                </a:rPr>
-                <a:t>Especular</a:t>
-              </a:r>
-            </a:p>
-          </p:txBody>
-        </p:sp>
-        <p:cxnSp>
-          <p:nvCxnSpPr>
-            <p:cNvPr id="20" name="Conexão recta unidireccional 19"/>
-            <p:cNvCxnSpPr>
-              <a:endCxn id="16" idx="1"/>
-            </p:cNvCxnSpPr>
-            <p:nvPr/>
-          </p:nvCxnSpPr>
-          <p:spPr>
-            <a:xfrm flipV="1">
-              <a:off x="-3564904" y="3098867"/>
-              <a:ext cx="3996444" cy="1003322"/>
-            </a:xfrm>
-            <a:prstGeom prst="straightConnector1">
-              <a:avLst/>
-            </a:prstGeom>
-            <a:ln w="19050">
-              <a:solidFill>
-                <a:srgbClr val="006600"/>
-              </a:solidFill>
-              <a:headEnd type="oval" w="lg" len="med"/>
-              <a:tailEnd type="arrow"/>
-            </a:ln>
-          </p:spPr>
-          <p:style>
-            <a:lnRef idx="1">
-              <a:schemeClr val="accent1"/>
-            </a:lnRef>
-            <a:fillRef idx="0">
-              <a:schemeClr val="accent1"/>
-            </a:fillRef>
-            <a:effectRef idx="0">
-              <a:schemeClr val="accent1"/>
-            </a:effectRef>
-            <a:fontRef idx="minor">
-              <a:schemeClr val="tx1"/>
-            </a:fontRef>
-          </p:style>
-        </p:cxnSp>
-      </p:grpSp>
-    </p:spTree>
-    <p:extLst>
-      <p:ext uri="{BB962C8B-B14F-4D97-AF65-F5344CB8AC3E}">
-        <p14:creationId xmlns:p14="http://schemas.microsoft.com/office/powerpoint/2010/main" val="3629698168"/>
-      </p:ext>
-    </p:extLst>
-  </p:cSld>
-  <p:clrMapOvr>
-    <a:masterClrMapping/>
-  </p:clrMapOvr>
-  <p:timing>
-    <p:tnLst>
-      <p:par>
-        <p:cTn id="1" dur="indefinite" restart="never" nodeType="tmRoot">
-          <p:childTnLst>
-            <p:seq concurrent="1" nextAc="seek">
-              <p:cTn id="2" dur="indefinite" nodeType="mainSeq">
-                <p:childTnLst>
-                  <p:par>
-                    <p:cTn id="3" fill="hold">
-                      <p:stCondLst>
-                        <p:cond delay="indefinite"/>
-                      </p:stCondLst>
-                      <p:childTnLst>
-                        <p:par>
-                          <p:cTn id="4" fill="hold">
-                            <p:stCondLst>
-                              <p:cond delay="0"/>
-                            </p:stCondLst>
-                            <p:childTnLst>
-                              <p:par>
-                                <p:cTn id="5" presetID="1" presetClass="entr" presetSubtype="0" fill="hold" nodeType="clickEffect">
-                                  <p:stCondLst>
-                                    <p:cond delay="0"/>
-                                  </p:stCondLst>
-                                  <p:childTnLst>
-                                    <p:set>
-                                      <p:cBhvr>
-                                        <p:cTn id="6" dur="1" fill="hold">
-                                          <p:stCondLst>
-                                            <p:cond delay="0"/>
-                                          </p:stCondLst>
-                                        </p:cTn>
-                                        <p:tgtEl>
-                                          <p:spTgt spid="15"/>
-                                        </p:tgtEl>
-                                        <p:attrNameLst>
-                                          <p:attrName>style.visibility</p:attrName>
-                                        </p:attrNameLst>
-                                      </p:cBhvr>
-                                      <p:to>
-                                        <p:strVal val="visible"/>
-                                      </p:to>
-                                    </p:set>
-                                  </p:childTnLst>
-                                </p:cTn>
-                              </p:par>
-                            </p:childTnLst>
-                          </p:cTn>
-                        </p:par>
-                      </p:childTnLst>
-                    </p:cTn>
-                  </p:par>
-                  <p:par>
-                    <p:cTn id="7" fill="hold">
-                      <p:stCondLst>
-                        <p:cond delay="indefinite"/>
-                      </p:stCondLst>
-                      <p:childTnLst>
-                        <p:par>
-                          <p:cTn id="8" fill="hold">
-                            <p:stCondLst>
-                              <p:cond delay="0"/>
-                            </p:stCondLst>
-                            <p:childTnLst>
-                              <p:par>
-                                <p:cTn id="9" presetID="1" presetClass="entr" presetSubtype="0" fill="hold" nodeType="clickEffect">
-                                  <p:stCondLst>
-                                    <p:cond delay="0"/>
-                                  </p:stCondLst>
-                                  <p:childTnLst>
-                                    <p:set>
-                                      <p:cBhvr>
-                                        <p:cTn id="10" dur="1" fill="hold">
-                                          <p:stCondLst>
-                                            <p:cond delay="0"/>
-                                          </p:stCondLst>
-                                        </p:cTn>
-                                        <p:tgtEl>
-                                          <p:spTgt spid="7"/>
-                                        </p:tgtEl>
-                                        <p:attrNameLst>
-                                          <p:attrName>style.visibility</p:attrName>
-                                        </p:attrNameLst>
-                                      </p:cBhvr>
-                                      <p:to>
-                                        <p:strVal val="visible"/>
-                                      </p:to>
-                                    </p:set>
-                                  </p:childTnLst>
-                                </p:cTn>
-                              </p:par>
-                            </p:childTnLst>
-                          </p:cTn>
-                        </p:par>
-                      </p:childTnLst>
-                    </p:cTn>
-                  </p:par>
-                  <p:par>
-                    <p:cTn id="11" fill="hold">
-                      <p:stCondLst>
-                        <p:cond delay="indefinite"/>
-                      </p:stCondLst>
-                      <p:childTnLst>
-                        <p:par>
-                          <p:cTn id="12" fill="hold">
-                            <p:stCondLst>
-                              <p:cond delay="0"/>
-                            </p:stCondLst>
-                            <p:childTnLst>
-                              <p:par>
-                                <p:cTn id="13" presetID="1" presetClass="entr" presetSubtype="0" fill="hold" nodeType="clickEffect">
-                                  <p:stCondLst>
-                                    <p:cond delay="0"/>
-                                  </p:stCondLst>
-                                  <p:childTnLst>
-                                    <p:set>
-                                      <p:cBhvr>
-                                        <p:cTn id="14" dur="1" fill="hold">
-                                          <p:stCondLst>
-                                            <p:cond delay="0"/>
-                                          </p:stCondLst>
-                                        </p:cTn>
-                                        <p:tgtEl>
-                                          <p:spTgt spid="11"/>
-                                        </p:tgtEl>
-                                        <p:attrNameLst>
-                                          <p:attrName>style.visibility</p:attrName>
-                                        </p:attrNameLst>
-                                      </p:cBhvr>
-                                      <p:to>
-                                        <p:strVal val="visible"/>
-                                      </p:to>
-                                    </p:set>
-                                  </p:childTnLst>
-                                </p:cTn>
-                              </p:par>
-                            </p:childTnLst>
-                          </p:cTn>
-                        </p:par>
-                      </p:childTnLst>
-                    </p:cTn>
-                  </p:par>
-                  <p:par>
-                    <p:cTn id="15" fill="hold">
-                      <p:stCondLst>
-                        <p:cond delay="indefinite"/>
-                      </p:stCondLst>
-                      <p:childTnLst>
-                        <p:par>
-                          <p:cTn id="16" fill="hold">
-                            <p:stCondLst>
-                              <p:cond delay="0"/>
-                            </p:stCondLst>
-                            <p:childTnLst>
-                              <p:par>
-                                <p:cTn id="17" presetID="1" presetClass="entr" presetSubtype="0" fill="hold" nodeType="clickEffect">
-                                  <p:stCondLst>
-                                    <p:cond delay="0"/>
-                                  </p:stCondLst>
-                                  <p:childTnLst>
-                                    <p:set>
-                                      <p:cBhvr>
-                                        <p:cTn id="18" dur="1" fill="hold">
-                                          <p:stCondLst>
-                                            <p:cond delay="0"/>
-                                          </p:stCondLst>
-                                        </p:cTn>
-                                        <p:tgtEl>
-                                          <p:spTgt spid="17"/>
-                                        </p:tgtEl>
-                                        <p:attrNameLst>
-                                          <p:attrName>style.visibility</p:attrName>
-                                        </p:attrNameLst>
-                                      </p:cBhvr>
-                                      <p:to>
-                                        <p:strVal val="visible"/>
-                                      </p:to>
-                                    </p:set>
-                                  </p:childTnLst>
-                                </p:cTn>
-                              </p:par>
-                            </p:childTnLst>
-                          </p:cTn>
-                        </p:par>
-                      </p:childTnLst>
-                    </p:cTn>
-                  </p:par>
-                </p:childTnLst>
-              </p:cTn>
-              <p:prevCondLst>
-                <p:cond evt="onPrev" delay="0">
-                  <p:tgtEl>
-                    <p:sldTgt/>
-                  </p:tgtEl>
-                </p:cond>
-              </p:prevCondLst>
-              <p:nextCondLst>
-                <p:cond evt="onNext" delay="0">
-                  <p:tgtEl>
-                    <p:sldTgt/>
-                  </p:tgtEl>
-                </p:cond>
-              </p:nextCondLst>
-            </p:seq>
-          </p:childTnLst>
-        </p:cTn>
-      </p:par>
-    </p:tnLst>
-  </p:timing>
-</p:sld>
-</file>
-
-<file path=ppt/slides/slide5.xml><?xml version="1.0" encoding="utf-8"?>
-<p:sld xmlns:a="http://schemas.openxmlformats.org/drawingml/2006/main" xmlns:r="http://schemas.openxmlformats.org/officeDocument/2006/relationships" xmlns:p="http://schemas.openxmlformats.org/presentationml/2006/main">
-  <p:cSld>
-    <p:spTree>
-      <p:nvGrpSpPr>
-        <p:cNvPr id="1" name=""/>
-        <p:cNvGrpSpPr/>
-        <p:nvPr/>
-      </p:nvGrpSpPr>
-      <p:grpSpPr>
-        <a:xfrm>
-          <a:off x="0" y="0"/>
-          <a:ext cx="0" cy="0"/>
-          <a:chOff x="0" y="0"/>
-          <a:chExt cx="0" cy="0"/>
-        </a:xfrm>
-      </p:grpSpPr>
-      <p:sp>
-        <p:nvSpPr>
-          <p:cNvPr id="17409" name="Marcador de Posição do Número do Diapositivo 4"/>
+          <p:cNvPr id="18433" name="Marcador de Posição do Número do Diapositivo 4"/>
           <p:cNvSpPr>
             <a:spLocks noGrp="1"/>
           </p:cNvSpPr>
@@ -5626,171 +5152,10 @@
           <a:bodyPr/>
           <a:lstStyle/>
           <a:p>
-            <a:fld id="{39BE7386-DBFC-4067-9680-1F92C978BD9B}" type="slidenum">
-              <a:rPr lang="pt-PT" smtClean="0"/>
-              <a:pPr/>
-              <a:t>5</a:t>
-            </a:fld>
-            <a:endParaRPr lang="pt-PT"/>
-          </a:p>
-        </p:txBody>
-      </p:sp>
-      <p:sp>
-        <p:nvSpPr>
-          <p:cNvPr id="17410" name="Rectangle 2"/>
-          <p:cNvSpPr>
-            <a:spLocks noGrp="1" noChangeArrowheads="1"/>
-          </p:cNvSpPr>
-          <p:nvPr>
-            <p:ph type="title"/>
-          </p:nvPr>
-        </p:nvSpPr>
-        <p:spPr/>
-        <p:txBody>
-          <a:bodyPr/>
-          <a:lstStyle/>
-          <a:p>
-            <a:pPr eaLnBrk="1" hangingPunct="1"/>
-            <a:r>
-              <a:rPr lang="en-GB"/>
-              <a:t>Bibliografia</a:t>
-            </a:r>
-          </a:p>
-        </p:txBody>
-      </p:sp>
-      <p:sp>
-        <p:nvSpPr>
-          <p:cNvPr id="17411" name="Rectangle 3"/>
-          <p:cNvSpPr>
-            <a:spLocks noGrp="1" noChangeArrowheads="1"/>
-          </p:cNvSpPr>
-          <p:nvPr>
-            <p:ph type="body" idx="1"/>
-          </p:nvPr>
-        </p:nvSpPr>
-        <p:spPr/>
-        <p:txBody>
-          <a:bodyPr/>
-          <a:lstStyle/>
-          <a:p>
-            <a:pPr eaLnBrk="1" hangingPunct="1"/>
-            <a:endParaRPr lang="en-GB" dirty="0"/>
-          </a:p>
-          <a:p>
-            <a:pPr eaLnBrk="1" hangingPunct="1"/>
-            <a:r>
-              <a:rPr lang="en-US" dirty="0"/>
-              <a:t>“Physically Based Rendering: from Theory to Implementation”; Matt Pharr and Greg Humphreys; Morgan Kaufmann; 3</a:t>
-            </a:r>
-            <a:r>
-              <a:rPr lang="en-US" baseline="30000" dirty="0"/>
-              <a:t>rd</a:t>
-            </a:r>
-            <a:r>
-              <a:rPr lang="en-US" dirty="0"/>
-              <a:t> Edition; 2014</a:t>
-            </a:r>
-            <a:br>
-              <a:rPr lang="en-US" dirty="0"/>
-            </a:br>
-            <a:r>
-              <a:rPr lang="en-US" dirty="0"/>
-              <a:t>(available at: http://www.pbr-book.org/)</a:t>
-            </a:r>
-            <a:endParaRPr lang="pt-PT" dirty="0"/>
-          </a:p>
-          <a:p>
-            <a:pPr eaLnBrk="1" hangingPunct="1"/>
-            <a:endParaRPr lang="en-GB" dirty="0"/>
-          </a:p>
-          <a:p>
-            <a:pPr eaLnBrk="1" hangingPunct="1"/>
-            <a:r>
-              <a:rPr lang="en-GB" dirty="0" err="1"/>
-              <a:t>Acetatos</a:t>
-            </a:r>
-            <a:endParaRPr lang="en-GB" dirty="0"/>
-          </a:p>
-          <a:p>
-            <a:pPr marL="0" indent="0" eaLnBrk="1" hangingPunct="1">
-              <a:buNone/>
-            </a:pPr>
-            <a:endParaRPr lang="en-GB" dirty="0"/>
-          </a:p>
-        </p:txBody>
-      </p:sp>
-      <p:sp>
-        <p:nvSpPr>
-          <p:cNvPr id="6" name="Marcador de Posição do Rodapé 5"/>
-          <p:cNvSpPr>
-            <a:spLocks noGrp="1"/>
-          </p:cNvSpPr>
-          <p:nvPr>
-            <p:ph type="ftr" sz="quarter" idx="10"/>
-          </p:nvPr>
-        </p:nvSpPr>
-        <p:spPr/>
-        <p:txBody>
-          <a:bodyPr/>
-          <a:lstStyle/>
-          <a:p>
-            <a:pPr>
-              <a:defRPr/>
-            </a:pPr>
-            <a:r>
-              <a:rPr lang="en-US"/>
-              <a:t>Visualização e Iluminação</a:t>
-            </a:r>
-            <a:endParaRPr lang="pt-PT"/>
-          </a:p>
-        </p:txBody>
-      </p:sp>
-    </p:spTree>
-  </p:cSld>
-  <p:clrMapOvr>
-    <a:masterClrMapping/>
-  </p:clrMapOvr>
-</p:sld>
-</file>
-
-<file path=ppt/slides/slide6.xml><?xml version="1.0" encoding="utf-8"?>
-<p:sld xmlns:a="http://schemas.openxmlformats.org/drawingml/2006/main" xmlns:r="http://schemas.openxmlformats.org/officeDocument/2006/relationships" xmlns:p="http://schemas.openxmlformats.org/presentationml/2006/main">
-  <p:cSld>
-    <p:spTree>
-      <p:nvGrpSpPr>
-        <p:cNvPr id="1" name=""/>
-        <p:cNvGrpSpPr/>
-        <p:nvPr/>
-      </p:nvGrpSpPr>
-      <p:grpSpPr>
-        <a:xfrm>
-          <a:off x="0" y="0"/>
-          <a:ext cx="0" cy="0"/>
-          <a:chOff x="0" y="0"/>
-          <a:chExt cx="0" cy="0"/>
-        </a:xfrm>
-      </p:grpSpPr>
-      <p:sp>
-        <p:nvSpPr>
-          <p:cNvPr id="18433" name="Marcador de Posição do Número do Diapositivo 4"/>
-          <p:cNvSpPr>
-            <a:spLocks noGrp="1"/>
-          </p:cNvSpPr>
-          <p:nvPr>
-            <p:ph type="sldNum" sz="quarter" idx="11"/>
-          </p:nvPr>
-        </p:nvSpPr>
-        <p:spPr>
-          <a:noFill/>
-        </p:spPr>
-        <p:txBody>
-          <a:bodyPr/>
-          <a:lstStyle/>
-          <a:p>
             <a:fld id="{68F69207-1D2C-4201-814A-E9496F86A3E4}" type="slidenum">
               <a:rPr lang="pt-PT" smtClean="0"/>
               <a:pPr/>
-              <a:t>6</a:t>
+              <a:t>4</a:t>
             </a:fld>
             <a:endParaRPr lang="pt-PT"/>
           </a:p>
@@ -5845,13 +5210,8 @@
             </a:r>
             <a:r>
               <a:rPr lang="pt-PT" dirty="0"/>
-              <a:t>: desenvolvimento de um </a:t>
-            </a:r>
-            <a:r>
-              <a:rPr lang="pt-PT" dirty="0" err="1"/>
-              <a:t>Renderer</a:t>
-            </a:r>
-            <a:endParaRPr lang="pt-PT" dirty="0"/>
+              <a:t>: resolução de um problema concreto</a:t>
+            </a:r>
           </a:p>
           <a:p>
             <a:pPr eaLnBrk="1" hangingPunct="1">
@@ -5864,7 +5224,7 @@
             </a:pPr>
             <a:r>
               <a:rPr lang="pt-PT" dirty="0"/>
-              <a:t>Grupos de 3 elementos</a:t>
+              <a:t>Grupos de 2 elementos</a:t>
             </a:r>
           </a:p>
           <a:p>
@@ -5878,7 +5238,29 @@
             </a:pPr>
             <a:r>
               <a:rPr lang="pt-PT" dirty="0"/>
-              <a:t>3 momentos de avaliação:</a:t>
+              <a:t>Início dos trabalhos na aula do dia 1 de Março</a:t>
+            </a:r>
+          </a:p>
+          <a:p>
+            <a:pPr eaLnBrk="1" hangingPunct="1">
+              <a:spcBef>
+                <a:spcPts val="800"/>
+              </a:spcBef>
+              <a:spcAft>
+                <a:spcPts val="1200"/>
+              </a:spcAft>
+            </a:pPr>
+            <a:r>
+              <a:rPr lang="pt-PT" dirty="0"/>
+              <a:t>Entrega até às 23h59 do dia 7 de Março (</a:t>
+            </a:r>
+            <a:r>
+              <a:rPr lang="pt-PT" dirty="0" err="1"/>
+              <a:t>eLearning</a:t>
+            </a:r>
+            <a:r>
+              <a:rPr lang="pt-PT" dirty="0"/>
+              <a:t>)</a:t>
             </a:r>
           </a:p>
           <a:p>
@@ -5891,8 +5273,28 @@
               </a:spcAft>
             </a:pPr>
             <a:r>
+              <a:rPr lang="pt-PT" dirty="0" err="1"/>
+              <a:t>jupyter</a:t>
+            </a:r>
+            <a:r>
               <a:rPr lang="pt-PT" dirty="0"/>
-              <a:t>março</a:t>
+              <a:t> </a:t>
+            </a:r>
+            <a:r>
+              <a:rPr lang="pt-PT" dirty="0" err="1"/>
+              <a:t>notebook</a:t>
+            </a:r>
+            <a:r>
+              <a:rPr lang="pt-PT" dirty="0"/>
+              <a:t> (.</a:t>
+            </a:r>
+            <a:r>
+              <a:rPr lang="pt-PT" dirty="0" err="1"/>
+              <a:t>ipynb</a:t>
+            </a:r>
+            <a:r>
+              <a:rPr lang="pt-PT" dirty="0"/>
+              <a:t>)</a:t>
             </a:r>
           </a:p>
           <a:p>
@@ -5906,22 +5308,20 @@
             </a:pPr>
             <a:r>
               <a:rPr lang="pt-PT" dirty="0"/>
-              <a:t>abril</a:t>
-            </a:r>
-          </a:p>
-          <a:p>
-            <a:pPr lvl="1" eaLnBrk="1" hangingPunct="1">
+              <a:t>Constitui-se como relatório (justificação das opções tomadas e análise de resultados)</a:t>
+            </a:r>
+          </a:p>
+          <a:p>
+            <a:pPr marL="0" indent="0" eaLnBrk="1" hangingPunct="1">
               <a:spcBef>
                 <a:spcPts val="800"/>
               </a:spcBef>
               <a:spcAft>
                 <a:spcPts val="1200"/>
               </a:spcAft>
+              <a:buNone/>
             </a:pPr>
-            <a:r>
-              <a:rPr lang="pt-PT" dirty="0"/>
-              <a:t>junho</a:t>
-            </a:r>
+            <a:endParaRPr lang="pt-PT" dirty="0"/>
           </a:p>
         </p:txBody>
       </p:sp>
@@ -5945,221 +5345,9 @@
             </a:pPr>
             <a:r>
               <a:rPr lang="en-US"/>
-              <a:t>Visualização e Iluminação</a:t>
+              <a:t>VC e Processamento de Imagem</a:t>
             </a:r>
             <a:endParaRPr lang="pt-PT" dirty="0"/>
-          </a:p>
-        </p:txBody>
-      </p:sp>
-    </p:spTree>
-  </p:cSld>
-  <p:clrMapOvr>
-    <a:masterClrMapping/>
-  </p:clrMapOvr>
-</p:sld>
-</file>
-
-<file path=ppt/slides/slide7.xml><?xml version="1.0" encoding="utf-8"?>
-<p:sld xmlns:a="http://schemas.openxmlformats.org/drawingml/2006/main" xmlns:r="http://schemas.openxmlformats.org/officeDocument/2006/relationships" xmlns:p="http://schemas.openxmlformats.org/presentationml/2006/main">
-  <p:cSld>
-    <p:spTree>
-      <p:nvGrpSpPr>
-        <p:cNvPr id="1" name=""/>
-        <p:cNvGrpSpPr/>
-        <p:nvPr/>
-      </p:nvGrpSpPr>
-      <p:grpSpPr>
-        <a:xfrm>
-          <a:off x="0" y="0"/>
-          <a:ext cx="0" cy="0"/>
-          <a:chOff x="0" y="0"/>
-          <a:chExt cx="0" cy="0"/>
-        </a:xfrm>
-      </p:grpSpPr>
-      <p:sp>
-        <p:nvSpPr>
-          <p:cNvPr id="16385" name="Marcador de Posição do Número do Diapositivo 4"/>
-          <p:cNvSpPr>
-            <a:spLocks noGrp="1"/>
-          </p:cNvSpPr>
-          <p:nvPr>
-            <p:ph type="sldNum" sz="quarter" idx="11"/>
-          </p:nvPr>
-        </p:nvSpPr>
-        <p:spPr>
-          <a:noFill/>
-        </p:spPr>
-        <p:txBody>
-          <a:bodyPr/>
-          <a:lstStyle/>
-          <a:p>
-            <a:fld id="{57DB1668-EC86-4192-9BA0-4B12B4DEC93F}" type="slidenum">
-              <a:rPr lang="pt-PT" smtClean="0"/>
-              <a:pPr/>
-              <a:t>7</a:t>
-            </a:fld>
-            <a:endParaRPr lang="pt-PT"/>
-          </a:p>
-        </p:txBody>
-      </p:sp>
-      <p:sp>
-        <p:nvSpPr>
-          <p:cNvPr id="16386" name="Rectangle 2"/>
-          <p:cNvSpPr>
-            <a:spLocks noGrp="1" noChangeArrowheads="1"/>
-          </p:cNvSpPr>
-          <p:nvPr>
-            <p:ph type="title"/>
-          </p:nvPr>
-        </p:nvSpPr>
-        <p:spPr/>
-        <p:txBody>
-          <a:bodyPr/>
-          <a:lstStyle/>
-          <a:p>
-            <a:pPr eaLnBrk="1" hangingPunct="1"/>
-            <a:r>
-              <a:rPr lang="pt-PT" dirty="0"/>
-              <a:t>Cronograma</a:t>
-            </a:r>
-          </a:p>
-        </p:txBody>
-      </p:sp>
-      <p:sp>
-        <p:nvSpPr>
-          <p:cNvPr id="16387" name="Rectangle 3"/>
-          <p:cNvSpPr>
-            <a:spLocks noGrp="1" noChangeArrowheads="1"/>
-          </p:cNvSpPr>
-          <p:nvPr>
-            <p:ph type="body" idx="1"/>
-          </p:nvPr>
-        </p:nvSpPr>
-        <p:spPr/>
-        <p:txBody>
-          <a:bodyPr/>
-          <a:lstStyle/>
-          <a:p>
-            <a:pPr eaLnBrk="1" hangingPunct="1">
-              <a:spcBef>
-                <a:spcPct val="60000"/>
-              </a:spcBef>
-            </a:pPr>
-            <a:r>
-              <a:rPr lang="pt-PT" dirty="0"/>
-              <a:t>Representação da Cena</a:t>
-            </a:r>
-          </a:p>
-          <a:p>
-            <a:pPr eaLnBrk="1" hangingPunct="1">
-              <a:spcBef>
-                <a:spcPct val="60000"/>
-              </a:spcBef>
-            </a:pPr>
-            <a:r>
-              <a:rPr lang="pt-PT" dirty="0"/>
-              <a:t>Intersecção Raio Triângulo</a:t>
-            </a:r>
-          </a:p>
-          <a:p>
-            <a:pPr eaLnBrk="1" hangingPunct="1">
-              <a:spcBef>
-                <a:spcPct val="60000"/>
-              </a:spcBef>
-            </a:pPr>
-            <a:r>
-              <a:rPr lang="pt-PT" dirty="0"/>
-              <a:t>Câmara (</a:t>
-            </a:r>
-            <a:r>
-              <a:rPr lang="pt-PT" dirty="0" err="1"/>
-              <a:t>perspectiva</a:t>
-            </a:r>
-            <a:r>
-              <a:rPr lang="pt-PT" dirty="0"/>
-              <a:t>)</a:t>
-            </a:r>
-          </a:p>
-          <a:p>
-            <a:pPr eaLnBrk="1" hangingPunct="1">
-              <a:spcBef>
-                <a:spcPct val="60000"/>
-              </a:spcBef>
-            </a:pPr>
-            <a:r>
-              <a:rPr lang="pt-PT" dirty="0"/>
-              <a:t>Raios primários</a:t>
-            </a:r>
-            <a:endParaRPr lang="en-GB" dirty="0"/>
-          </a:p>
-          <a:p>
-            <a:pPr eaLnBrk="1" hangingPunct="1">
-              <a:spcBef>
-                <a:spcPct val="60000"/>
-              </a:spcBef>
-            </a:pPr>
-            <a:r>
-              <a:rPr lang="pt-PT" dirty="0"/>
-              <a:t>Iluminação </a:t>
-            </a:r>
-            <a:r>
-              <a:rPr lang="pt-PT" dirty="0" err="1"/>
-              <a:t>Directa</a:t>
-            </a:r>
-            <a:endParaRPr lang="pt-PT" dirty="0"/>
-          </a:p>
-          <a:p>
-            <a:pPr eaLnBrk="1" hangingPunct="1">
-              <a:spcBef>
-                <a:spcPct val="60000"/>
-              </a:spcBef>
-            </a:pPr>
-            <a:r>
-              <a:rPr lang="pt-PT" dirty="0"/>
-              <a:t>Iluminação </a:t>
-            </a:r>
-            <a:r>
-              <a:rPr lang="pt-PT" dirty="0" err="1"/>
-              <a:t>Indirecta</a:t>
-            </a:r>
-            <a:endParaRPr lang="pt-PT" dirty="0"/>
-          </a:p>
-          <a:p>
-            <a:pPr eaLnBrk="1" hangingPunct="1">
-              <a:spcBef>
-                <a:spcPct val="60000"/>
-              </a:spcBef>
-            </a:pPr>
-            <a:r>
-              <a:rPr lang="pt-PT" dirty="0"/>
-              <a:t>Monte Carlo</a:t>
-            </a:r>
-          </a:p>
-        </p:txBody>
-      </p:sp>
-      <p:sp>
-        <p:nvSpPr>
-          <p:cNvPr id="6" name="Marcador de Posição do Rodapé 5"/>
-          <p:cNvSpPr>
-            <a:spLocks noGrp="1"/>
-          </p:cNvSpPr>
-          <p:nvPr>
-            <p:ph type="ftr" sz="quarter" idx="10"/>
-          </p:nvPr>
-        </p:nvSpPr>
-        <p:spPr/>
-        <p:txBody>
-          <a:bodyPr/>
-          <a:lstStyle/>
-          <a:p>
-            <a:pPr>
-              <a:defRPr/>
-            </a:pPr>
-            <a:r>
-              <a:rPr lang="en-US"/>
-              <a:t>Visualização e Iluminação</a:t>
-            </a:r>
-            <a:endParaRPr lang="pt-PT"/>
           </a:p>
         </p:txBody>
       </p:sp>

</xml_diff>